<commit_message>
additions of code and notebooks
</commit_message>
<xml_diff>
--- a/docs/ANN155_AAN160 lifetimes.pptx
+++ b/docs/ANN155_AAN160 lifetimes.pptx
@@ -6,7 +6,11 @@
   </p:sldMasterIdLst>
   <p:sldIdLst>
     <p:sldId id="257" r:id="rId2"/>
-    <p:sldId id="258" r:id="rId3"/>
+    <p:sldId id="259" r:id="rId3"/>
+    <p:sldId id="260" r:id="rId4"/>
+    <p:sldId id="258" r:id="rId5"/>
+    <p:sldId id="262" r:id="rId6"/>
+    <p:sldId id="261" r:id="rId7"/>
   </p:sldIdLst>
   <p:sldSz cx="12192000" cy="6858000"/>
   <p:notesSz cx="6858000" cy="9144000"/>
@@ -2986,13 +2990,13 @@
       </p:pic>
       <p:sp>
         <p:nvSpPr>
-          <p:cNvPr id="10" name="Elipse 9"/>
+          <p:cNvPr id="11" name="Elipse 10"/>
           <p:cNvSpPr/>
           <p:nvPr/>
         </p:nvSpPr>
         <p:spPr>
           <a:xfrm>
-            <a:off x="7290048" y="66305"/>
+            <a:off x="3269883" y="127900"/>
             <a:ext cx="870022" cy="1516695"/>
           </a:xfrm>
           <a:prstGeom prst="ellipse">
@@ -3052,25 +3056,25 @@
       </p:sp>
       <p:sp>
         <p:nvSpPr>
-          <p:cNvPr id="4" name="Elipse 3"/>
+          <p:cNvPr id="12" name="Elipse 11"/>
           <p:cNvSpPr/>
           <p:nvPr/>
         </p:nvSpPr>
         <p:spPr>
           <a:xfrm>
-            <a:off x="9365781" y="3878"/>
-            <a:ext cx="870022" cy="1516695"/>
+            <a:off x="2685111" y="66305"/>
+            <a:ext cx="870022" cy="1436542"/>
           </a:xfrm>
           <a:prstGeom prst="ellipse">
             <a:avLst/>
           </a:prstGeom>
           <a:gradFill flip="none" rotWithShape="1">
             <a:gsLst>
-              <a:gs pos="31000">
-                <a:srgbClr val="D2FDD6"/>
+              <a:gs pos="15000">
+                <a:srgbClr val="FFD5B9"/>
               </a:gs>
               <a:gs pos="0">
-                <a:srgbClr val="29F73D"/>
+                <a:srgbClr val="FFAF79"/>
               </a:gs>
               <a:gs pos="100000">
                 <a:schemeClr val="accent5">
@@ -3078,7 +3082,7 @@
                   <a:lumOff val="100000"/>
                 </a:schemeClr>
               </a:gs>
-              <a:gs pos="77000">
+              <a:gs pos="66000">
                 <a:schemeClr val="bg1"/>
               </a:gs>
             </a:gsLst>
@@ -3118,25 +3122,25 @@
       </p:sp>
       <p:sp>
         <p:nvSpPr>
-          <p:cNvPr id="5" name="Elipse 4"/>
+          <p:cNvPr id="13" name="Elipse 12"/>
           <p:cNvSpPr/>
           <p:nvPr/>
         </p:nvSpPr>
         <p:spPr>
           <a:xfrm>
-            <a:off x="8778801" y="3878"/>
-            <a:ext cx="870022" cy="1436542"/>
+            <a:off x="1114956" y="66305"/>
+            <a:ext cx="870022" cy="1516695"/>
           </a:xfrm>
           <a:prstGeom prst="ellipse">
             <a:avLst/>
           </a:prstGeom>
           <a:gradFill flip="none" rotWithShape="1">
             <a:gsLst>
-              <a:gs pos="15000">
-                <a:srgbClr val="FFD5B9"/>
+              <a:gs pos="31000">
+                <a:srgbClr val="D2FDD6"/>
               </a:gs>
               <a:gs pos="0">
-                <a:srgbClr val="FFAF79"/>
+                <a:srgbClr val="29F73D"/>
               </a:gs>
               <a:gs pos="100000">
                 <a:schemeClr val="accent5">
@@ -3144,7 +3148,7 @@
                   <a:lumOff val="100000"/>
                 </a:schemeClr>
               </a:gs>
-              <a:gs pos="66000">
+              <a:gs pos="77000">
                 <a:schemeClr val="bg1"/>
               </a:gs>
             </a:gsLst>
@@ -3184,6 +3188,839 @@
       </p:sp>
       <p:graphicFrame>
         <p:nvGraphicFramePr>
+          <p:cNvPr id="14" name="Objeto 13"/>
+          <p:cNvGraphicFramePr>
+            <a:graphicFrameLocks noChangeAspect="1"/>
+          </p:cNvGraphicFramePr>
+          <p:nvPr/>
+        </p:nvGraphicFramePr>
+        <p:xfrm>
+          <a:off x="839961" y="266700"/>
+          <a:ext cx="1022851" cy="1773845"/>
+        </p:xfrm>
+        <a:graphic>
+          <a:graphicData uri="http://schemas.openxmlformats.org/presentationml/2006/ole">
+            <mc:AlternateContent xmlns:mc="http://schemas.openxmlformats.org/markup-compatibility/2006">
+              <mc:Choice xmlns:v="urn:schemas-microsoft-com:vml" Requires="v">
+                <p:oleObj spid="_x0000_s1046" name="CS ChemDraw Drawing" r:id="rId4" imgW="1704751" imgH="2956409" progId="ChemDraw.Document.6.0">
+                  <p:embed/>
+                </p:oleObj>
+              </mc:Choice>
+              <mc:Fallback>
+                <p:oleObj name="CS ChemDraw Drawing" r:id="rId4" imgW="1704751" imgH="2956409" progId="ChemDraw.Document.6.0">
+                  <p:embed/>
+                  <p:pic>
+                    <p:nvPicPr>
+                      <p:cNvPr id="14" name="Objeto 13"/>
+                      <p:cNvPicPr/>
+                      <p:nvPr/>
+                    </p:nvPicPr>
+                    <p:blipFill>
+                      <a:blip r:embed="rId5"/>
+                      <a:stretch>
+                        <a:fillRect/>
+                      </a:stretch>
+                    </p:blipFill>
+                    <p:spPr>
+                      <a:xfrm>
+                        <a:off x="839961" y="266700"/>
+                        <a:ext cx="1022851" cy="1773845"/>
+                      </a:xfrm>
+                      <a:prstGeom prst="rect">
+                        <a:avLst/>
+                      </a:prstGeom>
+                    </p:spPr>
+                  </p:pic>
+                </p:oleObj>
+              </mc:Fallback>
+            </mc:AlternateContent>
+          </a:graphicData>
+        </a:graphic>
+      </p:graphicFrame>
+      <p:sp>
+        <p:nvSpPr>
+          <p:cNvPr id="15" name="CuadroTexto 14"/>
+          <p:cNvSpPr txBox="1"/>
+          <p:nvPr/>
+        </p:nvSpPr>
+        <p:spPr>
+          <a:xfrm>
+            <a:off x="215260" y="1237765"/>
+            <a:ext cx="950901" cy="369332"/>
+          </a:xfrm>
+          <a:prstGeom prst="rect">
+            <a:avLst/>
+          </a:prstGeom>
+          <a:noFill/>
+        </p:spPr>
+        <p:txBody>
+          <a:bodyPr wrap="none" rtlCol="0">
+            <a:spAutoFit/>
+          </a:bodyPr>
+          <a:lstStyle/>
+          <a:p>
+            <a:r>
+              <a:rPr lang="es-ES" dirty="0">
+                <a:solidFill>
+                  <a:srgbClr val="00B050"/>
+                </a:solidFill>
+              </a:rPr>
+              <a:t>AAN155</a:t>
+            </a:r>
+          </a:p>
+        </p:txBody>
+      </p:sp>
+      <p:graphicFrame>
+        <p:nvGraphicFramePr>
+          <p:cNvPr id="16" name="Objeto 15"/>
+          <p:cNvGraphicFramePr>
+            <a:graphicFrameLocks noChangeAspect="1"/>
+          </p:cNvGraphicFramePr>
+          <p:nvPr/>
+        </p:nvGraphicFramePr>
+        <p:xfrm>
+          <a:off x="2880623" y="266700"/>
+          <a:ext cx="1022851" cy="1773845"/>
+        </p:xfrm>
+        <a:graphic>
+          <a:graphicData uri="http://schemas.openxmlformats.org/presentationml/2006/ole">
+            <mc:AlternateContent xmlns:mc="http://schemas.openxmlformats.org/markup-compatibility/2006">
+              <mc:Choice xmlns:v="urn:schemas-microsoft-com:vml" Requires="v">
+                <p:oleObj spid="_x0000_s1047" name="CS ChemDraw Drawing" r:id="rId6" imgW="1704751" imgH="2956409" progId="ChemDraw.Document.6.0">
+                  <p:embed/>
+                </p:oleObj>
+              </mc:Choice>
+              <mc:Fallback>
+                <p:oleObj name="CS ChemDraw Drawing" r:id="rId6" imgW="1704751" imgH="2956409" progId="ChemDraw.Document.6.0">
+                  <p:embed/>
+                  <p:pic>
+                    <p:nvPicPr>
+                      <p:cNvPr id="16" name="Objeto 15"/>
+                      <p:cNvPicPr/>
+                      <p:nvPr/>
+                    </p:nvPicPr>
+                    <p:blipFill>
+                      <a:blip r:embed="rId7"/>
+                      <a:stretch>
+                        <a:fillRect/>
+                      </a:stretch>
+                    </p:blipFill>
+                    <p:spPr>
+                      <a:xfrm>
+                        <a:off x="2880623" y="266700"/>
+                        <a:ext cx="1022851" cy="1773845"/>
+                      </a:xfrm>
+                      <a:prstGeom prst="rect">
+                        <a:avLst/>
+                      </a:prstGeom>
+                    </p:spPr>
+                  </p:pic>
+                </p:oleObj>
+              </mc:Fallback>
+            </mc:AlternateContent>
+          </a:graphicData>
+        </a:graphic>
+      </p:graphicFrame>
+      <p:sp>
+        <p:nvSpPr>
+          <p:cNvPr id="17" name="CuadroTexto 16"/>
+          <p:cNvSpPr txBox="1"/>
+          <p:nvPr/>
+        </p:nvSpPr>
+        <p:spPr>
+          <a:xfrm>
+            <a:off x="3949657" y="1237765"/>
+            <a:ext cx="1457002" cy="369332"/>
+          </a:xfrm>
+          <a:prstGeom prst="rect">
+            <a:avLst/>
+          </a:prstGeom>
+          <a:noFill/>
+        </p:spPr>
+        <p:txBody>
+          <a:bodyPr wrap="none" rtlCol="0">
+            <a:spAutoFit/>
+          </a:bodyPr>
+          <a:lstStyle/>
+          <a:p>
+            <a:r>
+              <a:rPr lang="es-ES" dirty="0">
+                <a:solidFill>
+                  <a:srgbClr val="C00000"/>
+                </a:solidFill>
+              </a:rPr>
+              <a:t>AAN155+Ba</a:t>
+            </a:r>
+            <a:r>
+              <a:rPr lang="es-ES" baseline="30000" dirty="0">
+                <a:solidFill>
+                  <a:srgbClr val="C00000"/>
+                </a:solidFill>
+              </a:rPr>
+              <a:t>++</a:t>
+            </a:r>
+          </a:p>
+        </p:txBody>
+      </p:sp>
+      <p:sp>
+        <p:nvSpPr>
+          <p:cNvPr id="24" name="CuadroTexto 23"/>
+          <p:cNvSpPr txBox="1"/>
+          <p:nvPr/>
+        </p:nvSpPr>
+        <p:spPr>
+          <a:xfrm>
+            <a:off x="839961" y="2175309"/>
+            <a:ext cx="1484445" cy="646331"/>
+          </a:xfrm>
+          <a:prstGeom prst="rect">
+            <a:avLst/>
+          </a:prstGeom>
+          <a:noFill/>
+        </p:spPr>
+        <p:txBody>
+          <a:bodyPr wrap="none" rtlCol="0">
+            <a:spAutoFit/>
+          </a:bodyPr>
+          <a:lstStyle/>
+          <a:p>
+            <a:pPr algn="ctr"/>
+            <a:r>
+              <a:rPr lang="es-ES" sz="1200" dirty="0" err="1"/>
+              <a:t>Measured</a:t>
+            </a:r>
+            <a:r>
+              <a:rPr lang="es-ES" sz="1200" dirty="0"/>
+              <a:t> at 502 </a:t>
+            </a:r>
+            <a:r>
+              <a:rPr lang="es-ES" sz="1200" dirty="0" err="1"/>
+              <a:t>nm</a:t>
+            </a:r>
+            <a:endParaRPr lang="es-ES" sz="1200" dirty="0"/>
+          </a:p>
+          <a:p>
+            <a:pPr algn="ctr"/>
+            <a:r>
+              <a:rPr lang="es-ES" sz="1200" dirty="0">
+                <a:latin typeface="Symbol" panose="05050102010706020507" pitchFamily="18" charset="2"/>
+              </a:rPr>
+              <a:t>t</a:t>
+            </a:r>
+            <a:r>
+              <a:rPr lang="es-ES" sz="1200" dirty="0"/>
+              <a:t> 2.78 </a:t>
+            </a:r>
+            <a:r>
+              <a:rPr lang="es-ES" sz="1200" dirty="0" err="1"/>
+              <a:t>ns</a:t>
+            </a:r>
+            <a:r>
+              <a:rPr lang="es-ES" sz="1200" dirty="0"/>
+              <a:t> (100%)</a:t>
+            </a:r>
+          </a:p>
+          <a:p>
+            <a:pPr algn="ctr"/>
+            <a:r>
+              <a:rPr lang="es-ES" sz="1200" dirty="0">
+                <a:latin typeface="Symbol" panose="05050102010706020507" pitchFamily="18" charset="2"/>
+              </a:rPr>
+              <a:t>c</a:t>
+            </a:r>
+            <a:r>
+              <a:rPr lang="es-ES" sz="1200" baseline="30000" dirty="0"/>
+              <a:t>2</a:t>
+            </a:r>
+            <a:r>
+              <a:rPr lang="es-ES" sz="1200" dirty="0"/>
+              <a:t> 1.140 </a:t>
+            </a:r>
+          </a:p>
+        </p:txBody>
+      </p:sp>
+      <p:sp>
+        <p:nvSpPr>
+          <p:cNvPr id="28" name="CuadroTexto 27"/>
+          <p:cNvSpPr txBox="1"/>
+          <p:nvPr/>
+        </p:nvSpPr>
+        <p:spPr>
+          <a:xfrm>
+            <a:off x="2977658" y="2143935"/>
+            <a:ext cx="1497525" cy="1015663"/>
+          </a:xfrm>
+          <a:prstGeom prst="rect">
+            <a:avLst/>
+          </a:prstGeom>
+          <a:noFill/>
+        </p:spPr>
+        <p:txBody>
+          <a:bodyPr wrap="none" rtlCol="0">
+            <a:spAutoFit/>
+          </a:bodyPr>
+          <a:lstStyle/>
+          <a:p>
+            <a:pPr algn="ctr"/>
+            <a:r>
+              <a:rPr lang="es-ES" sz="1200" dirty="0" err="1"/>
+              <a:t>Measured</a:t>
+            </a:r>
+            <a:r>
+              <a:rPr lang="es-ES" sz="1200" dirty="0"/>
+              <a:t> at 618 </a:t>
+            </a:r>
+            <a:r>
+              <a:rPr lang="es-ES" sz="1200" dirty="0" err="1"/>
+              <a:t>nm</a:t>
+            </a:r>
+            <a:endParaRPr lang="es-ES" sz="1200" dirty="0"/>
+          </a:p>
+          <a:p>
+            <a:pPr algn="ctr"/>
+            <a:r>
+              <a:rPr lang="es-ES" sz="1200" dirty="0">
+                <a:latin typeface="Symbol" panose="05050102010706020507" pitchFamily="18" charset="2"/>
+              </a:rPr>
+              <a:t>t</a:t>
+            </a:r>
+            <a:r>
+              <a:rPr lang="es-ES" sz="1200" baseline="-25000" dirty="0">
+                <a:latin typeface="Symbol" panose="05050102010706020507" pitchFamily="18" charset="2"/>
+              </a:rPr>
+              <a:t>1</a:t>
+            </a:r>
+            <a:r>
+              <a:rPr lang="es-ES" sz="1200" dirty="0"/>
+              <a:t> 11.5 </a:t>
+            </a:r>
+            <a:r>
+              <a:rPr lang="es-ES" sz="1200" dirty="0" err="1"/>
+              <a:t>ns</a:t>
+            </a:r>
+            <a:r>
+              <a:rPr lang="es-ES" sz="1200" dirty="0"/>
+              <a:t> (5.4%)</a:t>
+            </a:r>
+          </a:p>
+          <a:p>
+            <a:pPr algn="ctr"/>
+            <a:r>
+              <a:rPr lang="es-ES" sz="1200" dirty="0">
+                <a:latin typeface="Symbol" panose="05050102010706020507" pitchFamily="18" charset="2"/>
+              </a:rPr>
+              <a:t>t</a:t>
+            </a:r>
+            <a:r>
+              <a:rPr lang="es-ES" sz="1200" baseline="-25000" dirty="0">
+                <a:latin typeface="Symbol" panose="05050102010706020507" pitchFamily="18" charset="2"/>
+              </a:rPr>
+              <a:t>2</a:t>
+            </a:r>
+            <a:r>
+              <a:rPr lang="es-ES" sz="1200" dirty="0">
+                <a:latin typeface="Symbol" panose="05050102010706020507" pitchFamily="18" charset="2"/>
+              </a:rPr>
+              <a:t> </a:t>
+            </a:r>
+            <a:r>
+              <a:rPr lang="es-ES" sz="1200" dirty="0"/>
+              <a:t>121.7 </a:t>
+            </a:r>
+            <a:r>
+              <a:rPr lang="es-ES" sz="1200" dirty="0" err="1"/>
+              <a:t>ns</a:t>
+            </a:r>
+            <a:r>
+              <a:rPr lang="es-ES" sz="1200" dirty="0"/>
+              <a:t> (67.8%)</a:t>
+            </a:r>
+          </a:p>
+          <a:p>
+            <a:pPr algn="ctr"/>
+            <a:r>
+              <a:rPr lang="es-ES" sz="1200" dirty="0">
+                <a:latin typeface="Symbol" panose="05050102010706020507" pitchFamily="18" charset="2"/>
+              </a:rPr>
+              <a:t>t</a:t>
+            </a:r>
+            <a:r>
+              <a:rPr lang="es-ES" sz="1200" baseline="-25000" dirty="0">
+                <a:latin typeface="Symbol" panose="05050102010706020507" pitchFamily="18" charset="2"/>
+              </a:rPr>
+              <a:t>3</a:t>
+            </a:r>
+            <a:r>
+              <a:rPr lang="es-ES" sz="1200" dirty="0">
+                <a:latin typeface="Symbol" panose="05050102010706020507" pitchFamily="18" charset="2"/>
+              </a:rPr>
+              <a:t> </a:t>
+            </a:r>
+            <a:r>
+              <a:rPr lang="es-ES" sz="1200" dirty="0"/>
+              <a:t> 379.8 </a:t>
+            </a:r>
+            <a:r>
+              <a:rPr lang="es-ES" sz="1200" dirty="0" err="1"/>
+              <a:t>ns</a:t>
+            </a:r>
+            <a:r>
+              <a:rPr lang="es-ES" sz="1200" dirty="0"/>
+              <a:t> (26.8%)</a:t>
+            </a:r>
+          </a:p>
+          <a:p>
+            <a:pPr algn="ctr"/>
+            <a:r>
+              <a:rPr lang="es-ES" sz="1200" dirty="0">
+                <a:latin typeface="Symbol" panose="05050102010706020507" pitchFamily="18" charset="2"/>
+              </a:rPr>
+              <a:t>c</a:t>
+            </a:r>
+            <a:r>
+              <a:rPr lang="es-ES" sz="1200" baseline="30000" dirty="0"/>
+              <a:t>2</a:t>
+            </a:r>
+            <a:r>
+              <a:rPr lang="es-ES" sz="1200" dirty="0"/>
+              <a:t> 0.9648</a:t>
+            </a:r>
+          </a:p>
+        </p:txBody>
+      </p:sp>
+      <p:sp>
+        <p:nvSpPr>
+          <p:cNvPr id="29" name="CuadroTexto 28"/>
+          <p:cNvSpPr txBox="1"/>
+          <p:nvPr/>
+        </p:nvSpPr>
+        <p:spPr>
+          <a:xfrm>
+            <a:off x="4381394" y="4886400"/>
+            <a:ext cx="1208985" cy="276999"/>
+          </a:xfrm>
+          <a:prstGeom prst="rect">
+            <a:avLst/>
+          </a:prstGeom>
+          <a:noFill/>
+        </p:spPr>
+        <p:txBody>
+          <a:bodyPr wrap="none" rtlCol="0">
+            <a:spAutoFit/>
+          </a:bodyPr>
+          <a:lstStyle/>
+          <a:p>
+            <a:r>
+              <a:rPr lang="es-ES" sz="1200" dirty="0">
+                <a:solidFill>
+                  <a:srgbClr val="00B050"/>
+                </a:solidFill>
+              </a:rPr>
+              <a:t>AAN155 618 </a:t>
+            </a:r>
+            <a:r>
+              <a:rPr lang="es-ES" sz="1200" dirty="0" err="1">
+                <a:solidFill>
+                  <a:srgbClr val="00B050"/>
+                </a:solidFill>
+              </a:rPr>
+              <a:t>nm</a:t>
+            </a:r>
+            <a:endParaRPr lang="es-ES" sz="1200" dirty="0">
+              <a:solidFill>
+                <a:srgbClr val="00B050"/>
+              </a:solidFill>
+            </a:endParaRPr>
+          </a:p>
+        </p:txBody>
+      </p:sp>
+      <p:sp>
+        <p:nvSpPr>
+          <p:cNvPr id="30" name="CuadroTexto 29"/>
+          <p:cNvSpPr txBox="1"/>
+          <p:nvPr/>
+        </p:nvSpPr>
+        <p:spPr>
+          <a:xfrm>
+            <a:off x="3938169" y="4447647"/>
+            <a:ext cx="1670650" cy="276999"/>
+          </a:xfrm>
+          <a:prstGeom prst="rect">
+            <a:avLst/>
+          </a:prstGeom>
+          <a:noFill/>
+        </p:spPr>
+        <p:txBody>
+          <a:bodyPr wrap="none" rtlCol="0">
+            <a:spAutoFit/>
+          </a:bodyPr>
+          <a:lstStyle/>
+          <a:p>
+            <a:r>
+              <a:rPr lang="es-ES" sz="1200" dirty="0">
+                <a:solidFill>
+                  <a:srgbClr val="C00000"/>
+                </a:solidFill>
+              </a:rPr>
+              <a:t>AAN155 +50 Ba 618 </a:t>
+            </a:r>
+            <a:r>
+              <a:rPr lang="es-ES" sz="1200" dirty="0" err="1">
+                <a:solidFill>
+                  <a:srgbClr val="C00000"/>
+                </a:solidFill>
+              </a:rPr>
+              <a:t>nm</a:t>
+            </a:r>
+            <a:endParaRPr lang="es-ES" sz="1200" dirty="0">
+              <a:solidFill>
+                <a:srgbClr val="C00000"/>
+              </a:solidFill>
+            </a:endParaRPr>
+          </a:p>
+        </p:txBody>
+      </p:sp>
+      <p:sp>
+        <p:nvSpPr>
+          <p:cNvPr id="32" name="CuadroTexto 31"/>
+          <p:cNvSpPr txBox="1"/>
+          <p:nvPr/>
+        </p:nvSpPr>
+        <p:spPr>
+          <a:xfrm>
+            <a:off x="1910700" y="2952086"/>
+            <a:ext cx="1548822" cy="276999"/>
+          </a:xfrm>
+          <a:prstGeom prst="rect">
+            <a:avLst/>
+          </a:prstGeom>
+          <a:noFill/>
+        </p:spPr>
+        <p:txBody>
+          <a:bodyPr wrap="none" rtlCol="0">
+            <a:spAutoFit/>
+          </a:bodyPr>
+          <a:lstStyle/>
+          <a:p>
+            <a:r>
+              <a:rPr lang="es-ES" sz="1200" b="1" dirty="0"/>
+              <a:t>LIFETIME MODE-MCS</a:t>
+            </a:r>
+          </a:p>
+        </p:txBody>
+      </p:sp>
+      <p:sp>
+        <p:nvSpPr>
+          <p:cNvPr id="35" name="CuadroTexto 34"/>
+          <p:cNvSpPr txBox="1"/>
+          <p:nvPr/>
+        </p:nvSpPr>
+        <p:spPr>
+          <a:xfrm>
+            <a:off x="1283666" y="2034421"/>
+            <a:ext cx="571054" cy="276999"/>
+          </a:xfrm>
+          <a:prstGeom prst="rect">
+            <a:avLst/>
+          </a:prstGeom>
+          <a:noFill/>
+        </p:spPr>
+        <p:txBody>
+          <a:bodyPr wrap="none" rtlCol="0">
+            <a:spAutoFit/>
+          </a:bodyPr>
+          <a:lstStyle/>
+          <a:p>
+            <a:r>
+              <a:rPr lang="es-ES" sz="1200" b="1" dirty="0"/>
+              <a:t>TCSPC</a:t>
+            </a:r>
+          </a:p>
+        </p:txBody>
+      </p:sp>
+      <p:sp>
+        <p:nvSpPr>
+          <p:cNvPr id="36" name="CuadroTexto 35"/>
+          <p:cNvSpPr txBox="1"/>
+          <p:nvPr/>
+        </p:nvSpPr>
+        <p:spPr>
+          <a:xfrm>
+            <a:off x="3400585" y="2042994"/>
+            <a:ext cx="473206" cy="276999"/>
+          </a:xfrm>
+          <a:prstGeom prst="rect">
+            <a:avLst/>
+          </a:prstGeom>
+          <a:noFill/>
+        </p:spPr>
+        <p:txBody>
+          <a:bodyPr wrap="none" rtlCol="0">
+            <a:spAutoFit/>
+          </a:bodyPr>
+          <a:lstStyle/>
+          <a:p>
+            <a:r>
+              <a:rPr lang="es-ES" sz="1200" b="1" dirty="0"/>
+              <a:t>MCS</a:t>
+            </a:r>
+          </a:p>
+        </p:txBody>
+      </p:sp>
+    </p:spTree>
+    <p:extLst>
+      <p:ext uri="{BB962C8B-B14F-4D97-AF65-F5344CB8AC3E}">
+        <p14:creationId xmlns:p14="http://schemas.microsoft.com/office/powerpoint/2010/main" val="2292768540"/>
+      </p:ext>
+    </p:extLst>
+  </p:cSld>
+  <p:clrMapOvr>
+    <a:masterClrMapping/>
+  </p:clrMapOvr>
+</p:sld>
+</file>
+
+<file path=ppt/slides/slide2.xml><?xml version="1.0" encoding="utf-8"?>
+<p:sld xmlns:a="http://schemas.openxmlformats.org/drawingml/2006/main" xmlns:r="http://schemas.openxmlformats.org/officeDocument/2006/relationships" xmlns:p="http://schemas.openxmlformats.org/presentationml/2006/main">
+  <p:cSld>
+    <p:spTree>
+      <p:nvGrpSpPr>
+        <p:cNvPr id="1" name=""/>
+        <p:cNvGrpSpPr/>
+        <p:nvPr/>
+      </p:nvGrpSpPr>
+      <p:grpSpPr>
+        <a:xfrm>
+          <a:off x="0" y="0"/>
+          <a:ext cx="0" cy="0"/>
+          <a:chOff x="0" y="0"/>
+          <a:chExt cx="0" cy="0"/>
+        </a:xfrm>
+      </p:grpSpPr>
+      <p:pic>
+        <p:nvPicPr>
+          <p:cNvPr id="22" name="Imagen 21"/>
+          <p:cNvPicPr>
+            <a:picLocks noChangeAspect="1"/>
+          </p:cNvPicPr>
+          <p:nvPr/>
+        </p:nvPicPr>
+        <p:blipFill>
+          <a:blip r:embed="rId3"/>
+          <a:stretch>
+            <a:fillRect/>
+          </a:stretch>
+        </p:blipFill>
+        <p:spPr>
+          <a:xfrm>
+            <a:off x="238391" y="3056336"/>
+            <a:ext cx="5456393" cy="3859102"/>
+          </a:xfrm>
+          <a:prstGeom prst="rect">
+            <a:avLst/>
+          </a:prstGeom>
+        </p:spPr>
+      </p:pic>
+      <p:sp>
+        <p:nvSpPr>
+          <p:cNvPr id="10" name="Elipse 9"/>
+          <p:cNvSpPr/>
+          <p:nvPr/>
+        </p:nvSpPr>
+        <p:spPr>
+          <a:xfrm>
+            <a:off x="7290048" y="66305"/>
+            <a:ext cx="870022" cy="1516695"/>
+          </a:xfrm>
+          <a:prstGeom prst="ellipse">
+            <a:avLst/>
+          </a:prstGeom>
+          <a:gradFill flip="none" rotWithShape="1">
+            <a:gsLst>
+              <a:gs pos="31000">
+                <a:srgbClr val="D2FDD6"/>
+              </a:gs>
+              <a:gs pos="0">
+                <a:srgbClr val="29F73D"/>
+              </a:gs>
+              <a:gs pos="100000">
+                <a:schemeClr val="accent5">
+                  <a:lumMod val="0"/>
+                  <a:lumOff val="100000"/>
+                </a:schemeClr>
+              </a:gs>
+              <a:gs pos="77000">
+                <a:schemeClr val="bg1"/>
+              </a:gs>
+            </a:gsLst>
+            <a:path path="circle">
+              <a:fillToRect l="50000" t="50000" r="50000" b="50000"/>
+            </a:path>
+            <a:tileRect/>
+          </a:gradFill>
+          <a:ln>
+            <a:noFill/>
+          </a:ln>
+        </p:spPr>
+        <p:style>
+          <a:lnRef idx="2">
+            <a:schemeClr val="accent1">
+              <a:shade val="50000"/>
+            </a:schemeClr>
+          </a:lnRef>
+          <a:fillRef idx="1">
+            <a:schemeClr val="accent1"/>
+          </a:fillRef>
+          <a:effectRef idx="0">
+            <a:schemeClr val="accent1"/>
+          </a:effectRef>
+          <a:fontRef idx="minor">
+            <a:schemeClr val="lt1"/>
+          </a:fontRef>
+        </p:style>
+        <p:txBody>
+          <a:bodyPr rtlCol="0" anchor="ctr"/>
+          <a:lstStyle/>
+          <a:p>
+            <a:pPr algn="ctr"/>
+            <a:endParaRPr lang="es-ES"/>
+          </a:p>
+        </p:txBody>
+      </p:sp>
+      <p:sp>
+        <p:nvSpPr>
+          <p:cNvPr id="4" name="Elipse 3"/>
+          <p:cNvSpPr/>
+          <p:nvPr/>
+        </p:nvSpPr>
+        <p:spPr>
+          <a:xfrm>
+            <a:off x="9365781" y="3878"/>
+            <a:ext cx="870022" cy="1516695"/>
+          </a:xfrm>
+          <a:prstGeom prst="ellipse">
+            <a:avLst/>
+          </a:prstGeom>
+          <a:gradFill flip="none" rotWithShape="1">
+            <a:gsLst>
+              <a:gs pos="31000">
+                <a:srgbClr val="D2FDD6"/>
+              </a:gs>
+              <a:gs pos="0">
+                <a:srgbClr val="29F73D"/>
+              </a:gs>
+              <a:gs pos="100000">
+                <a:schemeClr val="accent5">
+                  <a:lumMod val="0"/>
+                  <a:lumOff val="100000"/>
+                </a:schemeClr>
+              </a:gs>
+              <a:gs pos="77000">
+                <a:schemeClr val="bg1"/>
+              </a:gs>
+            </a:gsLst>
+            <a:path path="circle">
+              <a:fillToRect l="50000" t="50000" r="50000" b="50000"/>
+            </a:path>
+            <a:tileRect/>
+          </a:gradFill>
+          <a:ln>
+            <a:noFill/>
+          </a:ln>
+        </p:spPr>
+        <p:style>
+          <a:lnRef idx="2">
+            <a:schemeClr val="accent1">
+              <a:shade val="50000"/>
+            </a:schemeClr>
+          </a:lnRef>
+          <a:fillRef idx="1">
+            <a:schemeClr val="accent1"/>
+          </a:fillRef>
+          <a:effectRef idx="0">
+            <a:schemeClr val="accent1"/>
+          </a:effectRef>
+          <a:fontRef idx="minor">
+            <a:schemeClr val="lt1"/>
+          </a:fontRef>
+        </p:style>
+        <p:txBody>
+          <a:bodyPr rtlCol="0" anchor="ctr"/>
+          <a:lstStyle/>
+          <a:p>
+            <a:pPr algn="ctr"/>
+            <a:endParaRPr lang="es-ES"/>
+          </a:p>
+        </p:txBody>
+      </p:sp>
+      <p:sp>
+        <p:nvSpPr>
+          <p:cNvPr id="5" name="Elipse 4"/>
+          <p:cNvSpPr/>
+          <p:nvPr/>
+        </p:nvSpPr>
+        <p:spPr>
+          <a:xfrm>
+            <a:off x="8778801" y="3878"/>
+            <a:ext cx="870022" cy="1436542"/>
+          </a:xfrm>
+          <a:prstGeom prst="ellipse">
+            <a:avLst/>
+          </a:prstGeom>
+          <a:gradFill flip="none" rotWithShape="1">
+            <a:gsLst>
+              <a:gs pos="15000">
+                <a:srgbClr val="FFD5B9"/>
+              </a:gs>
+              <a:gs pos="0">
+                <a:srgbClr val="FFAF79"/>
+              </a:gs>
+              <a:gs pos="100000">
+                <a:schemeClr val="accent5">
+                  <a:lumMod val="0"/>
+                  <a:lumOff val="100000"/>
+                </a:schemeClr>
+              </a:gs>
+              <a:gs pos="66000">
+                <a:schemeClr val="bg1"/>
+              </a:gs>
+            </a:gsLst>
+            <a:path path="circle">
+              <a:fillToRect l="50000" t="50000" r="50000" b="50000"/>
+            </a:path>
+            <a:tileRect/>
+          </a:gradFill>
+          <a:ln>
+            <a:noFill/>
+          </a:ln>
+        </p:spPr>
+        <p:style>
+          <a:lnRef idx="2">
+            <a:schemeClr val="accent1">
+              <a:shade val="50000"/>
+            </a:schemeClr>
+          </a:lnRef>
+          <a:fillRef idx="1">
+            <a:schemeClr val="accent1"/>
+          </a:fillRef>
+          <a:effectRef idx="0">
+            <a:schemeClr val="accent1"/>
+          </a:effectRef>
+          <a:fontRef idx="minor">
+            <a:schemeClr val="lt1"/>
+          </a:fontRef>
+        </p:style>
+        <p:txBody>
+          <a:bodyPr rtlCol="0" anchor="ctr"/>
+          <a:lstStyle/>
+          <a:p>
+            <a:pPr algn="ctr"/>
+            <a:endParaRPr lang="es-ES"/>
+          </a:p>
+        </p:txBody>
+      </p:sp>
+      <p:graphicFrame>
+        <p:nvGraphicFramePr>
           <p:cNvPr id="6" name="Objeto 5"/>
           <p:cNvGraphicFramePr>
             <a:graphicFrameLocks noChangeAspect="1"/>
@@ -3198,7 +4035,7 @@
           <a:graphicData uri="http://schemas.openxmlformats.org/presentationml/2006/ole">
             <mc:AlternateContent xmlns:mc="http://schemas.openxmlformats.org/markup-compatibility/2006">
               <mc:Choice xmlns:v="urn:schemas-microsoft-com:vml" Requires="v">
-                <p:oleObj spid="_x0000_s1042" name="CS ChemDraw Drawing" r:id="rId4" imgW="2194224" imgH="2956409" progId="ChemDraw.Document.6.0">
+                <p:oleObj spid="_x0000_s3077" name="CS ChemDraw Drawing" r:id="rId4" imgW="2194224" imgH="2956409" progId="ChemDraw.Document.6.0">
                   <p:embed/>
                 </p:oleObj>
               </mc:Choice>
@@ -3282,7 +4119,7 @@
           <a:graphicData uri="http://schemas.openxmlformats.org/presentationml/2006/ole">
             <mc:AlternateContent xmlns:mc="http://schemas.openxmlformats.org/markup-compatibility/2006">
               <mc:Choice xmlns:v="urn:schemas-microsoft-com:vml" Requires="v">
-                <p:oleObj spid="_x0000_s1043" name="CS ChemDraw Drawing" r:id="rId6" imgW="2194224" imgH="2956409" progId="ChemDraw.Document.6.0">
+                <p:oleObj spid="_x0000_s3078" name="CS ChemDraw Drawing" r:id="rId6" imgW="2194224" imgH="2956409" progId="ChemDraw.Document.6.0">
                   <p:embed/>
                 </p:oleObj>
               </mc:Choice>
@@ -3572,7 +4409,7 @@
           <a:graphicData uri="http://schemas.openxmlformats.org/presentationml/2006/ole">
             <mc:AlternateContent xmlns:mc="http://schemas.openxmlformats.org/markup-compatibility/2006">
               <mc:Choice xmlns:v="urn:schemas-microsoft-com:vml" Requires="v">
-                <p:oleObj spid="_x0000_s1044" name="CS ChemDraw Drawing" r:id="rId8" imgW="1704751" imgH="2956409" progId="ChemDraw.Document.6.0">
+                <p:oleObj spid="_x0000_s3079" name="CS ChemDraw Drawing" r:id="rId8" imgW="1704751" imgH="2956409" progId="ChemDraw.Document.6.0">
                   <p:embed/>
                 </p:oleObj>
               </mc:Choice>
@@ -3656,7 +4493,7 @@
           <a:graphicData uri="http://schemas.openxmlformats.org/presentationml/2006/ole">
             <mc:AlternateContent xmlns:mc="http://schemas.openxmlformats.org/markup-compatibility/2006">
               <mc:Choice xmlns:v="urn:schemas-microsoft-com:vml" Requires="v">
-                <p:oleObj spid="_x0000_s1045" name="CS ChemDraw Drawing" r:id="rId10" imgW="1704751" imgH="2956409" progId="ChemDraw.Document.6.0">
+                <p:oleObj spid="_x0000_s3080" name="CS ChemDraw Drawing" r:id="rId10" imgW="1704751" imgH="2956409" progId="ChemDraw.Document.6.0">
                   <p:embed/>
                 </p:oleObj>
               </mc:Choice>
@@ -4569,7 +5406,7 @@
     </p:spTree>
     <p:extLst>
       <p:ext uri="{BB962C8B-B14F-4D97-AF65-F5344CB8AC3E}">
-        <p14:creationId xmlns:p14="http://schemas.microsoft.com/office/powerpoint/2010/main" val="2292768540"/>
+        <p14:creationId xmlns:p14="http://schemas.microsoft.com/office/powerpoint/2010/main" val="2350221789"/>
       </p:ext>
     </p:extLst>
   </p:cSld>
@@ -4579,7 +5416,1643 @@
 </p:sld>
 </file>
 
-<file path=ppt/slides/slide2.xml><?xml version="1.0" encoding="utf-8"?>
+<file path=ppt/slides/slide3.xml><?xml version="1.0" encoding="utf-8"?>
+<p:sld xmlns:a="http://schemas.openxmlformats.org/drawingml/2006/main" xmlns:r="http://schemas.openxmlformats.org/officeDocument/2006/relationships" xmlns:p="http://schemas.openxmlformats.org/presentationml/2006/main">
+  <p:cSld>
+    <p:spTree>
+      <p:nvGrpSpPr>
+        <p:cNvPr id="1" name=""/>
+        <p:cNvGrpSpPr/>
+        <p:nvPr/>
+      </p:nvGrpSpPr>
+      <p:grpSpPr>
+        <a:xfrm>
+          <a:off x="0" y="0"/>
+          <a:ext cx="0" cy="0"/>
+          <a:chOff x="0" y="0"/>
+          <a:chExt cx="0" cy="0"/>
+        </a:xfrm>
+      </p:grpSpPr>
+      <p:pic>
+        <p:nvPicPr>
+          <p:cNvPr id="22" name="Imagen 21"/>
+          <p:cNvPicPr>
+            <a:picLocks noChangeAspect="1"/>
+          </p:cNvPicPr>
+          <p:nvPr/>
+        </p:nvPicPr>
+        <p:blipFill>
+          <a:blip r:embed="rId3"/>
+          <a:stretch>
+            <a:fillRect/>
+          </a:stretch>
+        </p:blipFill>
+        <p:spPr>
+          <a:xfrm>
+            <a:off x="238391" y="3056336"/>
+            <a:ext cx="5456393" cy="3859102"/>
+          </a:xfrm>
+          <a:prstGeom prst="rect">
+            <a:avLst/>
+          </a:prstGeom>
+        </p:spPr>
+      </p:pic>
+      <p:sp>
+        <p:nvSpPr>
+          <p:cNvPr id="10" name="Elipse 9"/>
+          <p:cNvSpPr/>
+          <p:nvPr/>
+        </p:nvSpPr>
+        <p:spPr>
+          <a:xfrm>
+            <a:off x="7290048" y="66305"/>
+            <a:ext cx="870022" cy="1516695"/>
+          </a:xfrm>
+          <a:prstGeom prst="ellipse">
+            <a:avLst/>
+          </a:prstGeom>
+          <a:gradFill flip="none" rotWithShape="1">
+            <a:gsLst>
+              <a:gs pos="31000">
+                <a:srgbClr val="D2FDD6"/>
+              </a:gs>
+              <a:gs pos="0">
+                <a:srgbClr val="29F73D"/>
+              </a:gs>
+              <a:gs pos="100000">
+                <a:schemeClr val="accent5">
+                  <a:lumMod val="0"/>
+                  <a:lumOff val="100000"/>
+                </a:schemeClr>
+              </a:gs>
+              <a:gs pos="77000">
+                <a:schemeClr val="bg1"/>
+              </a:gs>
+            </a:gsLst>
+            <a:path path="circle">
+              <a:fillToRect l="50000" t="50000" r="50000" b="50000"/>
+            </a:path>
+            <a:tileRect/>
+          </a:gradFill>
+          <a:ln>
+            <a:noFill/>
+          </a:ln>
+        </p:spPr>
+        <p:style>
+          <a:lnRef idx="2">
+            <a:schemeClr val="accent1">
+              <a:shade val="50000"/>
+            </a:schemeClr>
+          </a:lnRef>
+          <a:fillRef idx="1">
+            <a:schemeClr val="accent1"/>
+          </a:fillRef>
+          <a:effectRef idx="0">
+            <a:schemeClr val="accent1"/>
+          </a:effectRef>
+          <a:fontRef idx="minor">
+            <a:schemeClr val="lt1"/>
+          </a:fontRef>
+        </p:style>
+        <p:txBody>
+          <a:bodyPr rtlCol="0" anchor="ctr"/>
+          <a:lstStyle/>
+          <a:p>
+            <a:pPr algn="ctr"/>
+            <a:endParaRPr lang="es-ES"/>
+          </a:p>
+        </p:txBody>
+      </p:sp>
+      <p:sp>
+        <p:nvSpPr>
+          <p:cNvPr id="4" name="Elipse 3"/>
+          <p:cNvSpPr/>
+          <p:nvPr/>
+        </p:nvSpPr>
+        <p:spPr>
+          <a:xfrm>
+            <a:off x="9365781" y="3878"/>
+            <a:ext cx="870022" cy="1516695"/>
+          </a:xfrm>
+          <a:prstGeom prst="ellipse">
+            <a:avLst/>
+          </a:prstGeom>
+          <a:gradFill flip="none" rotWithShape="1">
+            <a:gsLst>
+              <a:gs pos="31000">
+                <a:srgbClr val="D2FDD6"/>
+              </a:gs>
+              <a:gs pos="0">
+                <a:srgbClr val="29F73D"/>
+              </a:gs>
+              <a:gs pos="100000">
+                <a:schemeClr val="accent5">
+                  <a:lumMod val="0"/>
+                  <a:lumOff val="100000"/>
+                </a:schemeClr>
+              </a:gs>
+              <a:gs pos="77000">
+                <a:schemeClr val="bg1"/>
+              </a:gs>
+            </a:gsLst>
+            <a:path path="circle">
+              <a:fillToRect l="50000" t="50000" r="50000" b="50000"/>
+            </a:path>
+            <a:tileRect/>
+          </a:gradFill>
+          <a:ln>
+            <a:noFill/>
+          </a:ln>
+        </p:spPr>
+        <p:style>
+          <a:lnRef idx="2">
+            <a:schemeClr val="accent1">
+              <a:shade val="50000"/>
+            </a:schemeClr>
+          </a:lnRef>
+          <a:fillRef idx="1">
+            <a:schemeClr val="accent1"/>
+          </a:fillRef>
+          <a:effectRef idx="0">
+            <a:schemeClr val="accent1"/>
+          </a:effectRef>
+          <a:fontRef idx="minor">
+            <a:schemeClr val="lt1"/>
+          </a:fontRef>
+        </p:style>
+        <p:txBody>
+          <a:bodyPr rtlCol="0" anchor="ctr"/>
+          <a:lstStyle/>
+          <a:p>
+            <a:pPr algn="ctr"/>
+            <a:endParaRPr lang="es-ES"/>
+          </a:p>
+        </p:txBody>
+      </p:sp>
+      <p:sp>
+        <p:nvSpPr>
+          <p:cNvPr id="5" name="Elipse 4"/>
+          <p:cNvSpPr/>
+          <p:nvPr/>
+        </p:nvSpPr>
+        <p:spPr>
+          <a:xfrm>
+            <a:off x="8778801" y="3878"/>
+            <a:ext cx="870022" cy="1436542"/>
+          </a:xfrm>
+          <a:prstGeom prst="ellipse">
+            <a:avLst/>
+          </a:prstGeom>
+          <a:gradFill flip="none" rotWithShape="1">
+            <a:gsLst>
+              <a:gs pos="15000">
+                <a:srgbClr val="FFD5B9"/>
+              </a:gs>
+              <a:gs pos="0">
+                <a:srgbClr val="FFAF79"/>
+              </a:gs>
+              <a:gs pos="100000">
+                <a:schemeClr val="accent5">
+                  <a:lumMod val="0"/>
+                  <a:lumOff val="100000"/>
+                </a:schemeClr>
+              </a:gs>
+              <a:gs pos="66000">
+                <a:schemeClr val="bg1"/>
+              </a:gs>
+            </a:gsLst>
+            <a:path path="circle">
+              <a:fillToRect l="50000" t="50000" r="50000" b="50000"/>
+            </a:path>
+            <a:tileRect/>
+          </a:gradFill>
+          <a:ln>
+            <a:noFill/>
+          </a:ln>
+        </p:spPr>
+        <p:style>
+          <a:lnRef idx="2">
+            <a:schemeClr val="accent1">
+              <a:shade val="50000"/>
+            </a:schemeClr>
+          </a:lnRef>
+          <a:fillRef idx="1">
+            <a:schemeClr val="accent1"/>
+          </a:fillRef>
+          <a:effectRef idx="0">
+            <a:schemeClr val="accent1"/>
+          </a:effectRef>
+          <a:fontRef idx="minor">
+            <a:schemeClr val="lt1"/>
+          </a:fontRef>
+        </p:style>
+        <p:txBody>
+          <a:bodyPr rtlCol="0" anchor="ctr"/>
+          <a:lstStyle/>
+          <a:p>
+            <a:pPr algn="ctr"/>
+            <a:endParaRPr lang="es-ES"/>
+          </a:p>
+        </p:txBody>
+      </p:sp>
+      <p:graphicFrame>
+        <p:nvGraphicFramePr>
+          <p:cNvPr id="6" name="Objeto 5"/>
+          <p:cNvGraphicFramePr>
+            <a:graphicFrameLocks noChangeAspect="1"/>
+          </p:cNvGraphicFramePr>
+          <p:nvPr/>
+        </p:nvGraphicFramePr>
+        <p:xfrm>
+          <a:off x="6668301" y="266700"/>
+          <a:ext cx="1316038" cy="1773238"/>
+        </p:xfrm>
+        <a:graphic>
+          <a:graphicData uri="http://schemas.openxmlformats.org/presentationml/2006/ole">
+            <mc:AlternateContent xmlns:mc="http://schemas.openxmlformats.org/markup-compatibility/2006">
+              <mc:Choice xmlns:v="urn:schemas-microsoft-com:vml" Requires="v">
+                <p:oleObj spid="_x0000_s5125" name="CS ChemDraw Drawing" r:id="rId4" imgW="2194224" imgH="2956409" progId="ChemDraw.Document.6.0">
+                  <p:embed/>
+                </p:oleObj>
+              </mc:Choice>
+              <mc:Fallback>
+                <p:oleObj name="CS ChemDraw Drawing" r:id="rId4" imgW="2194224" imgH="2956409" progId="ChemDraw.Document.6.0">
+                  <p:embed/>
+                  <p:pic>
+                    <p:nvPicPr>
+                      <p:cNvPr id="6" name="Objeto 5"/>
+                      <p:cNvPicPr/>
+                      <p:nvPr/>
+                    </p:nvPicPr>
+                    <p:blipFill>
+                      <a:blip r:embed="rId5"/>
+                      <a:stretch>
+                        <a:fillRect/>
+                      </a:stretch>
+                    </p:blipFill>
+                    <p:spPr>
+                      <a:xfrm>
+                        <a:off x="6668301" y="266700"/>
+                        <a:ext cx="1316038" cy="1773238"/>
+                      </a:xfrm>
+                      <a:prstGeom prst="rect">
+                        <a:avLst/>
+                      </a:prstGeom>
+                    </p:spPr>
+                  </p:pic>
+                </p:oleObj>
+              </mc:Fallback>
+            </mc:AlternateContent>
+          </a:graphicData>
+        </a:graphic>
+      </p:graphicFrame>
+      <p:sp>
+        <p:nvSpPr>
+          <p:cNvPr id="7" name="CuadroTexto 6"/>
+          <p:cNvSpPr txBox="1"/>
+          <p:nvPr/>
+        </p:nvSpPr>
+        <p:spPr>
+          <a:xfrm>
+            <a:off x="6221952" y="1237765"/>
+            <a:ext cx="950901" cy="369332"/>
+          </a:xfrm>
+          <a:prstGeom prst="rect">
+            <a:avLst/>
+          </a:prstGeom>
+          <a:noFill/>
+        </p:spPr>
+        <p:txBody>
+          <a:bodyPr wrap="none" rtlCol="0">
+            <a:spAutoFit/>
+          </a:bodyPr>
+          <a:lstStyle/>
+          <a:p>
+            <a:r>
+              <a:rPr lang="es-ES" dirty="0">
+                <a:solidFill>
+                  <a:srgbClr val="00B050"/>
+                </a:solidFill>
+              </a:rPr>
+              <a:t>AAN160</a:t>
+            </a:r>
+          </a:p>
+        </p:txBody>
+      </p:sp>
+      <p:graphicFrame>
+        <p:nvGraphicFramePr>
+          <p:cNvPr id="8" name="Objeto 7"/>
+          <p:cNvGraphicFramePr>
+            <a:graphicFrameLocks noChangeAspect="1"/>
+          </p:cNvGraphicFramePr>
+          <p:nvPr/>
+        </p:nvGraphicFramePr>
+        <p:xfrm>
+          <a:off x="8863373" y="266700"/>
+          <a:ext cx="1316038" cy="1773238"/>
+        </p:xfrm>
+        <a:graphic>
+          <a:graphicData uri="http://schemas.openxmlformats.org/presentationml/2006/ole">
+            <mc:AlternateContent xmlns:mc="http://schemas.openxmlformats.org/markup-compatibility/2006">
+              <mc:Choice xmlns:v="urn:schemas-microsoft-com:vml" Requires="v">
+                <p:oleObj spid="_x0000_s5126" name="CS ChemDraw Drawing" r:id="rId6" imgW="2194224" imgH="2956409" progId="ChemDraw.Document.6.0">
+                  <p:embed/>
+                </p:oleObj>
+              </mc:Choice>
+              <mc:Fallback>
+                <p:oleObj name="CS ChemDraw Drawing" r:id="rId6" imgW="2194224" imgH="2956409" progId="ChemDraw.Document.6.0">
+                  <p:embed/>
+                  <p:pic>
+                    <p:nvPicPr>
+                      <p:cNvPr id="8" name="Objeto 7"/>
+                      <p:cNvPicPr/>
+                      <p:nvPr/>
+                    </p:nvPicPr>
+                    <p:blipFill>
+                      <a:blip r:embed="rId7"/>
+                      <a:stretch>
+                        <a:fillRect/>
+                      </a:stretch>
+                    </p:blipFill>
+                    <p:spPr>
+                      <a:xfrm>
+                        <a:off x="8863373" y="266700"/>
+                        <a:ext cx="1316038" cy="1773238"/>
+                      </a:xfrm>
+                      <a:prstGeom prst="rect">
+                        <a:avLst/>
+                      </a:prstGeom>
+                    </p:spPr>
+                  </p:pic>
+                </p:oleObj>
+              </mc:Fallback>
+            </mc:AlternateContent>
+          </a:graphicData>
+        </a:graphic>
+      </p:graphicFrame>
+      <p:sp>
+        <p:nvSpPr>
+          <p:cNvPr id="9" name="CuadroTexto 8"/>
+          <p:cNvSpPr txBox="1"/>
+          <p:nvPr/>
+        </p:nvSpPr>
+        <p:spPr>
+          <a:xfrm>
+            <a:off x="10140414" y="1237765"/>
+            <a:ext cx="1457002" cy="369332"/>
+          </a:xfrm>
+          <a:prstGeom prst="rect">
+            <a:avLst/>
+          </a:prstGeom>
+          <a:noFill/>
+        </p:spPr>
+        <p:txBody>
+          <a:bodyPr wrap="none" rtlCol="0">
+            <a:spAutoFit/>
+          </a:bodyPr>
+          <a:lstStyle/>
+          <a:p>
+            <a:r>
+              <a:rPr lang="es-ES" dirty="0">
+                <a:solidFill>
+                  <a:srgbClr val="C00000"/>
+                </a:solidFill>
+              </a:rPr>
+              <a:t>AAN160+Ba</a:t>
+            </a:r>
+            <a:r>
+              <a:rPr lang="es-ES" baseline="30000" dirty="0">
+                <a:solidFill>
+                  <a:srgbClr val="C00000"/>
+                </a:solidFill>
+              </a:rPr>
+              <a:t>++</a:t>
+            </a:r>
+          </a:p>
+        </p:txBody>
+      </p:sp>
+      <p:sp>
+        <p:nvSpPr>
+          <p:cNvPr id="11" name="Elipse 10"/>
+          <p:cNvSpPr/>
+          <p:nvPr/>
+        </p:nvSpPr>
+        <p:spPr>
+          <a:xfrm>
+            <a:off x="3269883" y="127900"/>
+            <a:ext cx="870022" cy="1516695"/>
+          </a:xfrm>
+          <a:prstGeom prst="ellipse">
+            <a:avLst/>
+          </a:prstGeom>
+          <a:gradFill flip="none" rotWithShape="1">
+            <a:gsLst>
+              <a:gs pos="31000">
+                <a:srgbClr val="D2FDD6"/>
+              </a:gs>
+              <a:gs pos="0">
+                <a:srgbClr val="29F73D"/>
+              </a:gs>
+              <a:gs pos="100000">
+                <a:schemeClr val="accent5">
+                  <a:lumMod val="0"/>
+                  <a:lumOff val="100000"/>
+                </a:schemeClr>
+              </a:gs>
+              <a:gs pos="77000">
+                <a:schemeClr val="bg1"/>
+              </a:gs>
+            </a:gsLst>
+            <a:path path="circle">
+              <a:fillToRect l="50000" t="50000" r="50000" b="50000"/>
+            </a:path>
+            <a:tileRect/>
+          </a:gradFill>
+          <a:ln>
+            <a:noFill/>
+          </a:ln>
+        </p:spPr>
+        <p:style>
+          <a:lnRef idx="2">
+            <a:schemeClr val="accent1">
+              <a:shade val="50000"/>
+            </a:schemeClr>
+          </a:lnRef>
+          <a:fillRef idx="1">
+            <a:schemeClr val="accent1"/>
+          </a:fillRef>
+          <a:effectRef idx="0">
+            <a:schemeClr val="accent1"/>
+          </a:effectRef>
+          <a:fontRef idx="minor">
+            <a:schemeClr val="lt1"/>
+          </a:fontRef>
+        </p:style>
+        <p:txBody>
+          <a:bodyPr rtlCol="0" anchor="ctr"/>
+          <a:lstStyle/>
+          <a:p>
+            <a:pPr algn="ctr"/>
+            <a:endParaRPr lang="es-ES"/>
+          </a:p>
+        </p:txBody>
+      </p:sp>
+      <p:sp>
+        <p:nvSpPr>
+          <p:cNvPr id="12" name="Elipse 11"/>
+          <p:cNvSpPr/>
+          <p:nvPr/>
+        </p:nvSpPr>
+        <p:spPr>
+          <a:xfrm>
+            <a:off x="2685111" y="66305"/>
+            <a:ext cx="870022" cy="1436542"/>
+          </a:xfrm>
+          <a:prstGeom prst="ellipse">
+            <a:avLst/>
+          </a:prstGeom>
+          <a:gradFill flip="none" rotWithShape="1">
+            <a:gsLst>
+              <a:gs pos="15000">
+                <a:srgbClr val="FFD5B9"/>
+              </a:gs>
+              <a:gs pos="0">
+                <a:srgbClr val="FFAF79"/>
+              </a:gs>
+              <a:gs pos="100000">
+                <a:schemeClr val="accent5">
+                  <a:lumMod val="0"/>
+                  <a:lumOff val="100000"/>
+                </a:schemeClr>
+              </a:gs>
+              <a:gs pos="66000">
+                <a:schemeClr val="bg1"/>
+              </a:gs>
+            </a:gsLst>
+            <a:path path="circle">
+              <a:fillToRect l="50000" t="50000" r="50000" b="50000"/>
+            </a:path>
+            <a:tileRect/>
+          </a:gradFill>
+          <a:ln>
+            <a:noFill/>
+          </a:ln>
+        </p:spPr>
+        <p:style>
+          <a:lnRef idx="2">
+            <a:schemeClr val="accent1">
+              <a:shade val="50000"/>
+            </a:schemeClr>
+          </a:lnRef>
+          <a:fillRef idx="1">
+            <a:schemeClr val="accent1"/>
+          </a:fillRef>
+          <a:effectRef idx="0">
+            <a:schemeClr val="accent1"/>
+          </a:effectRef>
+          <a:fontRef idx="minor">
+            <a:schemeClr val="lt1"/>
+          </a:fontRef>
+        </p:style>
+        <p:txBody>
+          <a:bodyPr rtlCol="0" anchor="ctr"/>
+          <a:lstStyle/>
+          <a:p>
+            <a:pPr algn="ctr"/>
+            <a:endParaRPr lang="es-ES"/>
+          </a:p>
+        </p:txBody>
+      </p:sp>
+      <p:sp>
+        <p:nvSpPr>
+          <p:cNvPr id="13" name="Elipse 12"/>
+          <p:cNvSpPr/>
+          <p:nvPr/>
+        </p:nvSpPr>
+        <p:spPr>
+          <a:xfrm>
+            <a:off x="1114956" y="66305"/>
+            <a:ext cx="870022" cy="1516695"/>
+          </a:xfrm>
+          <a:prstGeom prst="ellipse">
+            <a:avLst/>
+          </a:prstGeom>
+          <a:gradFill flip="none" rotWithShape="1">
+            <a:gsLst>
+              <a:gs pos="31000">
+                <a:srgbClr val="D2FDD6"/>
+              </a:gs>
+              <a:gs pos="0">
+                <a:srgbClr val="29F73D"/>
+              </a:gs>
+              <a:gs pos="100000">
+                <a:schemeClr val="accent5">
+                  <a:lumMod val="0"/>
+                  <a:lumOff val="100000"/>
+                </a:schemeClr>
+              </a:gs>
+              <a:gs pos="77000">
+                <a:schemeClr val="bg1"/>
+              </a:gs>
+            </a:gsLst>
+            <a:path path="circle">
+              <a:fillToRect l="50000" t="50000" r="50000" b="50000"/>
+            </a:path>
+            <a:tileRect/>
+          </a:gradFill>
+          <a:ln>
+            <a:noFill/>
+          </a:ln>
+        </p:spPr>
+        <p:style>
+          <a:lnRef idx="2">
+            <a:schemeClr val="accent1">
+              <a:shade val="50000"/>
+            </a:schemeClr>
+          </a:lnRef>
+          <a:fillRef idx="1">
+            <a:schemeClr val="accent1"/>
+          </a:fillRef>
+          <a:effectRef idx="0">
+            <a:schemeClr val="accent1"/>
+          </a:effectRef>
+          <a:fontRef idx="minor">
+            <a:schemeClr val="lt1"/>
+          </a:fontRef>
+        </p:style>
+        <p:txBody>
+          <a:bodyPr rtlCol="0" anchor="ctr"/>
+          <a:lstStyle/>
+          <a:p>
+            <a:pPr algn="ctr"/>
+            <a:endParaRPr lang="es-ES"/>
+          </a:p>
+        </p:txBody>
+      </p:sp>
+      <p:graphicFrame>
+        <p:nvGraphicFramePr>
+          <p:cNvPr id="14" name="Objeto 13"/>
+          <p:cNvGraphicFramePr>
+            <a:graphicFrameLocks noChangeAspect="1"/>
+          </p:cNvGraphicFramePr>
+          <p:nvPr/>
+        </p:nvGraphicFramePr>
+        <p:xfrm>
+          <a:off x="839961" y="266700"/>
+          <a:ext cx="1022851" cy="1773845"/>
+        </p:xfrm>
+        <a:graphic>
+          <a:graphicData uri="http://schemas.openxmlformats.org/presentationml/2006/ole">
+            <mc:AlternateContent xmlns:mc="http://schemas.openxmlformats.org/markup-compatibility/2006">
+              <mc:Choice xmlns:v="urn:schemas-microsoft-com:vml" Requires="v">
+                <p:oleObj spid="_x0000_s5127" name="CS ChemDraw Drawing" r:id="rId8" imgW="1704751" imgH="2956409" progId="ChemDraw.Document.6.0">
+                  <p:embed/>
+                </p:oleObj>
+              </mc:Choice>
+              <mc:Fallback>
+                <p:oleObj name="CS ChemDraw Drawing" r:id="rId8" imgW="1704751" imgH="2956409" progId="ChemDraw.Document.6.0">
+                  <p:embed/>
+                  <p:pic>
+                    <p:nvPicPr>
+                      <p:cNvPr id="14" name="Objeto 13"/>
+                      <p:cNvPicPr/>
+                      <p:nvPr/>
+                    </p:nvPicPr>
+                    <p:blipFill>
+                      <a:blip r:embed="rId9"/>
+                      <a:stretch>
+                        <a:fillRect/>
+                      </a:stretch>
+                    </p:blipFill>
+                    <p:spPr>
+                      <a:xfrm>
+                        <a:off x="839961" y="266700"/>
+                        <a:ext cx="1022851" cy="1773845"/>
+                      </a:xfrm>
+                      <a:prstGeom prst="rect">
+                        <a:avLst/>
+                      </a:prstGeom>
+                    </p:spPr>
+                  </p:pic>
+                </p:oleObj>
+              </mc:Fallback>
+            </mc:AlternateContent>
+          </a:graphicData>
+        </a:graphic>
+      </p:graphicFrame>
+      <p:sp>
+        <p:nvSpPr>
+          <p:cNvPr id="15" name="CuadroTexto 14"/>
+          <p:cNvSpPr txBox="1"/>
+          <p:nvPr/>
+        </p:nvSpPr>
+        <p:spPr>
+          <a:xfrm>
+            <a:off x="215260" y="1237765"/>
+            <a:ext cx="950901" cy="369332"/>
+          </a:xfrm>
+          <a:prstGeom prst="rect">
+            <a:avLst/>
+          </a:prstGeom>
+          <a:noFill/>
+        </p:spPr>
+        <p:txBody>
+          <a:bodyPr wrap="none" rtlCol="0">
+            <a:spAutoFit/>
+          </a:bodyPr>
+          <a:lstStyle/>
+          <a:p>
+            <a:r>
+              <a:rPr lang="es-ES" dirty="0">
+                <a:solidFill>
+                  <a:srgbClr val="00B050"/>
+                </a:solidFill>
+              </a:rPr>
+              <a:t>AAN155</a:t>
+            </a:r>
+          </a:p>
+        </p:txBody>
+      </p:sp>
+      <p:graphicFrame>
+        <p:nvGraphicFramePr>
+          <p:cNvPr id="16" name="Objeto 15"/>
+          <p:cNvGraphicFramePr>
+            <a:graphicFrameLocks noChangeAspect="1"/>
+          </p:cNvGraphicFramePr>
+          <p:nvPr/>
+        </p:nvGraphicFramePr>
+        <p:xfrm>
+          <a:off x="2880623" y="266700"/>
+          <a:ext cx="1022851" cy="1773845"/>
+        </p:xfrm>
+        <a:graphic>
+          <a:graphicData uri="http://schemas.openxmlformats.org/presentationml/2006/ole">
+            <mc:AlternateContent xmlns:mc="http://schemas.openxmlformats.org/markup-compatibility/2006">
+              <mc:Choice xmlns:v="urn:schemas-microsoft-com:vml" Requires="v">
+                <p:oleObj spid="_x0000_s5128" name="CS ChemDraw Drawing" r:id="rId10" imgW="1704751" imgH="2956409" progId="ChemDraw.Document.6.0">
+                  <p:embed/>
+                </p:oleObj>
+              </mc:Choice>
+              <mc:Fallback>
+                <p:oleObj name="CS ChemDraw Drawing" r:id="rId10" imgW="1704751" imgH="2956409" progId="ChemDraw.Document.6.0">
+                  <p:embed/>
+                  <p:pic>
+                    <p:nvPicPr>
+                      <p:cNvPr id="16" name="Objeto 15"/>
+                      <p:cNvPicPr/>
+                      <p:nvPr/>
+                    </p:nvPicPr>
+                    <p:blipFill>
+                      <a:blip r:embed="rId11"/>
+                      <a:stretch>
+                        <a:fillRect/>
+                      </a:stretch>
+                    </p:blipFill>
+                    <p:spPr>
+                      <a:xfrm>
+                        <a:off x="2880623" y="266700"/>
+                        <a:ext cx="1022851" cy="1773845"/>
+                      </a:xfrm>
+                      <a:prstGeom prst="rect">
+                        <a:avLst/>
+                      </a:prstGeom>
+                    </p:spPr>
+                  </p:pic>
+                </p:oleObj>
+              </mc:Fallback>
+            </mc:AlternateContent>
+          </a:graphicData>
+        </a:graphic>
+      </p:graphicFrame>
+      <p:sp>
+        <p:nvSpPr>
+          <p:cNvPr id="17" name="CuadroTexto 16"/>
+          <p:cNvSpPr txBox="1"/>
+          <p:nvPr/>
+        </p:nvSpPr>
+        <p:spPr>
+          <a:xfrm>
+            <a:off x="3949657" y="1237765"/>
+            <a:ext cx="1457002" cy="369332"/>
+          </a:xfrm>
+          <a:prstGeom prst="rect">
+            <a:avLst/>
+          </a:prstGeom>
+          <a:noFill/>
+        </p:spPr>
+        <p:txBody>
+          <a:bodyPr wrap="none" rtlCol="0">
+            <a:spAutoFit/>
+          </a:bodyPr>
+          <a:lstStyle/>
+          <a:p>
+            <a:r>
+              <a:rPr lang="es-ES" dirty="0">
+                <a:solidFill>
+                  <a:srgbClr val="C00000"/>
+                </a:solidFill>
+              </a:rPr>
+              <a:t>AAN155+Ba</a:t>
+            </a:r>
+            <a:r>
+              <a:rPr lang="es-ES" baseline="30000" dirty="0">
+                <a:solidFill>
+                  <a:srgbClr val="C00000"/>
+                </a:solidFill>
+              </a:rPr>
+              <a:t>++</a:t>
+            </a:r>
+          </a:p>
+        </p:txBody>
+      </p:sp>
+      <p:sp>
+        <p:nvSpPr>
+          <p:cNvPr id="24" name="CuadroTexto 23"/>
+          <p:cNvSpPr txBox="1"/>
+          <p:nvPr/>
+        </p:nvSpPr>
+        <p:spPr>
+          <a:xfrm>
+            <a:off x="839961" y="2175309"/>
+            <a:ext cx="1484445" cy="646331"/>
+          </a:xfrm>
+          <a:prstGeom prst="rect">
+            <a:avLst/>
+          </a:prstGeom>
+          <a:noFill/>
+        </p:spPr>
+        <p:txBody>
+          <a:bodyPr wrap="none" rtlCol="0">
+            <a:spAutoFit/>
+          </a:bodyPr>
+          <a:lstStyle/>
+          <a:p>
+            <a:pPr algn="ctr"/>
+            <a:r>
+              <a:rPr lang="es-ES" sz="1200" dirty="0" err="1"/>
+              <a:t>Measured</a:t>
+            </a:r>
+            <a:r>
+              <a:rPr lang="es-ES" sz="1200" dirty="0"/>
+              <a:t> at 502 </a:t>
+            </a:r>
+            <a:r>
+              <a:rPr lang="es-ES" sz="1200" dirty="0" err="1"/>
+              <a:t>nm</a:t>
+            </a:r>
+            <a:endParaRPr lang="es-ES" sz="1200" dirty="0"/>
+          </a:p>
+          <a:p>
+            <a:pPr algn="ctr"/>
+            <a:r>
+              <a:rPr lang="es-ES" sz="1200" dirty="0">
+                <a:latin typeface="Symbol" panose="05050102010706020507" pitchFamily="18" charset="2"/>
+              </a:rPr>
+              <a:t>t</a:t>
+            </a:r>
+            <a:r>
+              <a:rPr lang="es-ES" sz="1200" dirty="0"/>
+              <a:t> 2.78 </a:t>
+            </a:r>
+            <a:r>
+              <a:rPr lang="es-ES" sz="1200" dirty="0" err="1"/>
+              <a:t>ns</a:t>
+            </a:r>
+            <a:r>
+              <a:rPr lang="es-ES" sz="1200" dirty="0"/>
+              <a:t> (100%)</a:t>
+            </a:r>
+          </a:p>
+          <a:p>
+            <a:pPr algn="ctr"/>
+            <a:r>
+              <a:rPr lang="es-ES" sz="1200" dirty="0">
+                <a:latin typeface="Symbol" panose="05050102010706020507" pitchFamily="18" charset="2"/>
+              </a:rPr>
+              <a:t>c</a:t>
+            </a:r>
+            <a:r>
+              <a:rPr lang="es-ES" sz="1200" baseline="30000" dirty="0"/>
+              <a:t>2</a:t>
+            </a:r>
+            <a:r>
+              <a:rPr lang="es-ES" sz="1200" dirty="0"/>
+              <a:t> 1.140 </a:t>
+            </a:r>
+          </a:p>
+        </p:txBody>
+      </p:sp>
+      <p:sp>
+        <p:nvSpPr>
+          <p:cNvPr id="28" name="CuadroTexto 27"/>
+          <p:cNvSpPr txBox="1"/>
+          <p:nvPr/>
+        </p:nvSpPr>
+        <p:spPr>
+          <a:xfrm>
+            <a:off x="2977658" y="2143935"/>
+            <a:ext cx="1497525" cy="1015663"/>
+          </a:xfrm>
+          <a:prstGeom prst="rect">
+            <a:avLst/>
+          </a:prstGeom>
+          <a:noFill/>
+        </p:spPr>
+        <p:txBody>
+          <a:bodyPr wrap="none" rtlCol="0">
+            <a:spAutoFit/>
+          </a:bodyPr>
+          <a:lstStyle/>
+          <a:p>
+            <a:pPr algn="ctr"/>
+            <a:r>
+              <a:rPr lang="es-ES" sz="1200" dirty="0" err="1"/>
+              <a:t>Measured</a:t>
+            </a:r>
+            <a:r>
+              <a:rPr lang="es-ES" sz="1200" dirty="0"/>
+              <a:t> at 618 </a:t>
+            </a:r>
+            <a:r>
+              <a:rPr lang="es-ES" sz="1200" dirty="0" err="1"/>
+              <a:t>nm</a:t>
+            </a:r>
+            <a:endParaRPr lang="es-ES" sz="1200" dirty="0"/>
+          </a:p>
+          <a:p>
+            <a:pPr algn="ctr"/>
+            <a:r>
+              <a:rPr lang="es-ES" sz="1200" dirty="0">
+                <a:latin typeface="Symbol" panose="05050102010706020507" pitchFamily="18" charset="2"/>
+              </a:rPr>
+              <a:t>t</a:t>
+            </a:r>
+            <a:r>
+              <a:rPr lang="es-ES" sz="1200" baseline="-25000" dirty="0">
+                <a:latin typeface="Symbol" panose="05050102010706020507" pitchFamily="18" charset="2"/>
+              </a:rPr>
+              <a:t>1</a:t>
+            </a:r>
+            <a:r>
+              <a:rPr lang="es-ES" sz="1200" dirty="0"/>
+              <a:t> 11.5 </a:t>
+            </a:r>
+            <a:r>
+              <a:rPr lang="es-ES" sz="1200" dirty="0" err="1"/>
+              <a:t>ns</a:t>
+            </a:r>
+            <a:r>
+              <a:rPr lang="es-ES" sz="1200" dirty="0"/>
+              <a:t> (5.4%)</a:t>
+            </a:r>
+          </a:p>
+          <a:p>
+            <a:pPr algn="ctr"/>
+            <a:r>
+              <a:rPr lang="es-ES" sz="1200" dirty="0">
+                <a:latin typeface="Symbol" panose="05050102010706020507" pitchFamily="18" charset="2"/>
+              </a:rPr>
+              <a:t>t</a:t>
+            </a:r>
+            <a:r>
+              <a:rPr lang="es-ES" sz="1200" baseline="-25000" dirty="0">
+                <a:latin typeface="Symbol" panose="05050102010706020507" pitchFamily="18" charset="2"/>
+              </a:rPr>
+              <a:t>2</a:t>
+            </a:r>
+            <a:r>
+              <a:rPr lang="es-ES" sz="1200" dirty="0">
+                <a:latin typeface="Symbol" panose="05050102010706020507" pitchFamily="18" charset="2"/>
+              </a:rPr>
+              <a:t> </a:t>
+            </a:r>
+            <a:r>
+              <a:rPr lang="es-ES" sz="1200" dirty="0"/>
+              <a:t>121.7 </a:t>
+            </a:r>
+            <a:r>
+              <a:rPr lang="es-ES" sz="1200" dirty="0" err="1"/>
+              <a:t>ns</a:t>
+            </a:r>
+            <a:r>
+              <a:rPr lang="es-ES" sz="1200" dirty="0"/>
+              <a:t> (67.8%)</a:t>
+            </a:r>
+          </a:p>
+          <a:p>
+            <a:pPr algn="ctr"/>
+            <a:r>
+              <a:rPr lang="es-ES" sz="1200" dirty="0">
+                <a:latin typeface="Symbol" panose="05050102010706020507" pitchFamily="18" charset="2"/>
+              </a:rPr>
+              <a:t>t</a:t>
+            </a:r>
+            <a:r>
+              <a:rPr lang="es-ES" sz="1200" baseline="-25000" dirty="0">
+                <a:latin typeface="Symbol" panose="05050102010706020507" pitchFamily="18" charset="2"/>
+              </a:rPr>
+              <a:t>3</a:t>
+            </a:r>
+            <a:r>
+              <a:rPr lang="es-ES" sz="1200" dirty="0">
+                <a:latin typeface="Symbol" panose="05050102010706020507" pitchFamily="18" charset="2"/>
+              </a:rPr>
+              <a:t> </a:t>
+            </a:r>
+            <a:r>
+              <a:rPr lang="es-ES" sz="1200" dirty="0"/>
+              <a:t> 379.8 </a:t>
+            </a:r>
+            <a:r>
+              <a:rPr lang="es-ES" sz="1200" dirty="0" err="1"/>
+              <a:t>ns</a:t>
+            </a:r>
+            <a:r>
+              <a:rPr lang="es-ES" sz="1200" dirty="0"/>
+              <a:t> (26.8%)</a:t>
+            </a:r>
+          </a:p>
+          <a:p>
+            <a:pPr algn="ctr"/>
+            <a:r>
+              <a:rPr lang="es-ES" sz="1200" dirty="0">
+                <a:latin typeface="Symbol" panose="05050102010706020507" pitchFamily="18" charset="2"/>
+              </a:rPr>
+              <a:t>c</a:t>
+            </a:r>
+            <a:r>
+              <a:rPr lang="es-ES" sz="1200" baseline="30000" dirty="0"/>
+              <a:t>2</a:t>
+            </a:r>
+            <a:r>
+              <a:rPr lang="es-ES" sz="1200" dirty="0"/>
+              <a:t> 0.9648</a:t>
+            </a:r>
+          </a:p>
+        </p:txBody>
+      </p:sp>
+      <p:sp>
+        <p:nvSpPr>
+          <p:cNvPr id="29" name="CuadroTexto 28"/>
+          <p:cNvSpPr txBox="1"/>
+          <p:nvPr/>
+        </p:nvSpPr>
+        <p:spPr>
+          <a:xfrm>
+            <a:off x="4381394" y="4886400"/>
+            <a:ext cx="1208985" cy="276999"/>
+          </a:xfrm>
+          <a:prstGeom prst="rect">
+            <a:avLst/>
+          </a:prstGeom>
+          <a:noFill/>
+        </p:spPr>
+        <p:txBody>
+          <a:bodyPr wrap="none" rtlCol="0">
+            <a:spAutoFit/>
+          </a:bodyPr>
+          <a:lstStyle/>
+          <a:p>
+            <a:r>
+              <a:rPr lang="es-ES" sz="1200" dirty="0">
+                <a:solidFill>
+                  <a:srgbClr val="00B050"/>
+                </a:solidFill>
+              </a:rPr>
+              <a:t>AAN155 618 </a:t>
+            </a:r>
+            <a:r>
+              <a:rPr lang="es-ES" sz="1200" dirty="0" err="1">
+                <a:solidFill>
+                  <a:srgbClr val="00B050"/>
+                </a:solidFill>
+              </a:rPr>
+              <a:t>nm</a:t>
+            </a:r>
+            <a:endParaRPr lang="es-ES" sz="1200" dirty="0">
+              <a:solidFill>
+                <a:srgbClr val="00B050"/>
+              </a:solidFill>
+            </a:endParaRPr>
+          </a:p>
+        </p:txBody>
+      </p:sp>
+      <p:sp>
+        <p:nvSpPr>
+          <p:cNvPr id="30" name="CuadroTexto 29"/>
+          <p:cNvSpPr txBox="1"/>
+          <p:nvPr/>
+        </p:nvSpPr>
+        <p:spPr>
+          <a:xfrm>
+            <a:off x="3938169" y="4447647"/>
+            <a:ext cx="1670650" cy="276999"/>
+          </a:xfrm>
+          <a:prstGeom prst="rect">
+            <a:avLst/>
+          </a:prstGeom>
+          <a:noFill/>
+        </p:spPr>
+        <p:txBody>
+          <a:bodyPr wrap="none" rtlCol="0">
+            <a:spAutoFit/>
+          </a:bodyPr>
+          <a:lstStyle/>
+          <a:p>
+            <a:r>
+              <a:rPr lang="es-ES" sz="1200" dirty="0">
+                <a:solidFill>
+                  <a:srgbClr val="C00000"/>
+                </a:solidFill>
+              </a:rPr>
+              <a:t>AAN155 +50 Ba 618 </a:t>
+            </a:r>
+            <a:r>
+              <a:rPr lang="es-ES" sz="1200" dirty="0" err="1">
+                <a:solidFill>
+                  <a:srgbClr val="C00000"/>
+                </a:solidFill>
+              </a:rPr>
+              <a:t>nm</a:t>
+            </a:r>
+            <a:endParaRPr lang="es-ES" sz="1200" dirty="0">
+              <a:solidFill>
+                <a:srgbClr val="C00000"/>
+              </a:solidFill>
+            </a:endParaRPr>
+          </a:p>
+        </p:txBody>
+      </p:sp>
+      <p:sp>
+        <p:nvSpPr>
+          <p:cNvPr id="32" name="CuadroTexto 31"/>
+          <p:cNvSpPr txBox="1"/>
+          <p:nvPr/>
+        </p:nvSpPr>
+        <p:spPr>
+          <a:xfrm>
+            <a:off x="1910700" y="2952086"/>
+            <a:ext cx="1548822" cy="276999"/>
+          </a:xfrm>
+          <a:prstGeom prst="rect">
+            <a:avLst/>
+          </a:prstGeom>
+          <a:noFill/>
+        </p:spPr>
+        <p:txBody>
+          <a:bodyPr wrap="none" rtlCol="0">
+            <a:spAutoFit/>
+          </a:bodyPr>
+          <a:lstStyle/>
+          <a:p>
+            <a:r>
+              <a:rPr lang="es-ES" sz="1200" b="1" dirty="0"/>
+              <a:t>LIFETIME MODE-MCS</a:t>
+            </a:r>
+          </a:p>
+        </p:txBody>
+      </p:sp>
+      <p:sp>
+        <p:nvSpPr>
+          <p:cNvPr id="25" name="CuadroTexto 24"/>
+          <p:cNvSpPr txBox="1"/>
+          <p:nvPr/>
+        </p:nvSpPr>
+        <p:spPr>
+          <a:xfrm>
+            <a:off x="9127973" y="2143935"/>
+            <a:ext cx="1497525" cy="1015663"/>
+          </a:xfrm>
+          <a:prstGeom prst="rect">
+            <a:avLst/>
+          </a:prstGeom>
+          <a:noFill/>
+        </p:spPr>
+        <p:txBody>
+          <a:bodyPr wrap="none" rtlCol="0">
+            <a:spAutoFit/>
+          </a:bodyPr>
+          <a:lstStyle/>
+          <a:p>
+            <a:pPr algn="ctr"/>
+            <a:r>
+              <a:rPr lang="es-ES" sz="1200" dirty="0" err="1"/>
+              <a:t>Measured</a:t>
+            </a:r>
+            <a:r>
+              <a:rPr lang="es-ES" sz="1200" dirty="0"/>
+              <a:t> at 618 </a:t>
+            </a:r>
+            <a:r>
+              <a:rPr lang="es-ES" sz="1200" dirty="0" err="1"/>
+              <a:t>nm</a:t>
+            </a:r>
+            <a:endParaRPr lang="es-ES" sz="1200" dirty="0"/>
+          </a:p>
+          <a:p>
+            <a:pPr algn="ctr"/>
+            <a:r>
+              <a:rPr lang="es-ES" sz="1200" dirty="0">
+                <a:latin typeface="Symbol" panose="05050102010706020507" pitchFamily="18" charset="2"/>
+              </a:rPr>
+              <a:t>t</a:t>
+            </a:r>
+            <a:r>
+              <a:rPr lang="es-ES" sz="1200" baseline="-25000" dirty="0">
+                <a:latin typeface="Symbol" panose="05050102010706020507" pitchFamily="18" charset="2"/>
+              </a:rPr>
+              <a:t>1</a:t>
+            </a:r>
+            <a:r>
+              <a:rPr lang="es-ES" sz="1200" dirty="0"/>
+              <a:t> 7.0 </a:t>
+            </a:r>
+            <a:r>
+              <a:rPr lang="es-ES" sz="1200" dirty="0" err="1"/>
+              <a:t>ns</a:t>
+            </a:r>
+            <a:r>
+              <a:rPr lang="es-ES" sz="1200" dirty="0"/>
+              <a:t> (8.7%)</a:t>
+            </a:r>
+          </a:p>
+          <a:p>
+            <a:pPr algn="ctr"/>
+            <a:r>
+              <a:rPr lang="es-ES" sz="1200" dirty="0">
+                <a:latin typeface="Symbol" panose="05050102010706020507" pitchFamily="18" charset="2"/>
+              </a:rPr>
+              <a:t>t</a:t>
+            </a:r>
+            <a:r>
+              <a:rPr lang="es-ES" sz="1200" baseline="-25000" dirty="0">
+                <a:latin typeface="Symbol" panose="05050102010706020507" pitchFamily="18" charset="2"/>
+              </a:rPr>
+              <a:t>2</a:t>
+            </a:r>
+            <a:r>
+              <a:rPr lang="es-ES" sz="1200" dirty="0">
+                <a:latin typeface="Symbol" panose="05050102010706020507" pitchFamily="18" charset="2"/>
+              </a:rPr>
+              <a:t> </a:t>
+            </a:r>
+            <a:r>
+              <a:rPr lang="es-ES" sz="1200" dirty="0"/>
+              <a:t>122.5 </a:t>
+            </a:r>
+            <a:r>
+              <a:rPr lang="es-ES" sz="1200" dirty="0" err="1"/>
+              <a:t>ns</a:t>
+            </a:r>
+            <a:r>
+              <a:rPr lang="es-ES" sz="1200" dirty="0"/>
+              <a:t> (11.3%)</a:t>
+            </a:r>
+          </a:p>
+          <a:p>
+            <a:pPr algn="ctr"/>
+            <a:r>
+              <a:rPr lang="es-ES" sz="1200" dirty="0">
+                <a:latin typeface="Symbol" panose="05050102010706020507" pitchFamily="18" charset="2"/>
+              </a:rPr>
+              <a:t>t</a:t>
+            </a:r>
+            <a:r>
+              <a:rPr lang="es-ES" sz="1200" baseline="-25000" dirty="0">
+                <a:latin typeface="Symbol" panose="05050102010706020507" pitchFamily="18" charset="2"/>
+              </a:rPr>
+              <a:t>3</a:t>
+            </a:r>
+            <a:r>
+              <a:rPr lang="es-ES" sz="1200" dirty="0">
+                <a:latin typeface="Symbol" panose="05050102010706020507" pitchFamily="18" charset="2"/>
+              </a:rPr>
+              <a:t> </a:t>
+            </a:r>
+            <a:r>
+              <a:rPr lang="es-ES" sz="1200" dirty="0"/>
+              <a:t> 1033.8 </a:t>
+            </a:r>
+            <a:r>
+              <a:rPr lang="es-ES" sz="1200" dirty="0" err="1"/>
+              <a:t>ns</a:t>
+            </a:r>
+            <a:r>
+              <a:rPr lang="es-ES" sz="1200" dirty="0"/>
+              <a:t> (80.0%)</a:t>
+            </a:r>
+          </a:p>
+          <a:p>
+            <a:pPr algn="ctr"/>
+            <a:r>
+              <a:rPr lang="es-ES" sz="1200" dirty="0">
+                <a:latin typeface="Symbol" panose="05050102010706020507" pitchFamily="18" charset="2"/>
+              </a:rPr>
+              <a:t>c</a:t>
+            </a:r>
+            <a:r>
+              <a:rPr lang="es-ES" sz="1200" baseline="30000" dirty="0"/>
+              <a:t>2</a:t>
+            </a:r>
+            <a:r>
+              <a:rPr lang="es-ES" sz="1200" dirty="0"/>
+              <a:t> 0.9648</a:t>
+            </a:r>
+          </a:p>
+        </p:txBody>
+      </p:sp>
+      <p:pic>
+        <p:nvPicPr>
+          <p:cNvPr id="27" name="Imagen 26"/>
+          <p:cNvPicPr>
+            <a:picLocks noChangeAspect="1"/>
+          </p:cNvPicPr>
+          <p:nvPr/>
+        </p:nvPicPr>
+        <p:blipFill>
+          <a:blip r:embed="rId12"/>
+          <a:stretch>
+            <a:fillRect/>
+          </a:stretch>
+        </p:blipFill>
+        <p:spPr>
+          <a:xfrm>
+            <a:off x="6162020" y="3159598"/>
+            <a:ext cx="5456393" cy="3859102"/>
+          </a:xfrm>
+          <a:prstGeom prst="rect">
+            <a:avLst/>
+          </a:prstGeom>
+        </p:spPr>
+      </p:pic>
+      <p:sp>
+        <p:nvSpPr>
+          <p:cNvPr id="31" name="CuadroTexto 30"/>
+          <p:cNvSpPr txBox="1"/>
+          <p:nvPr/>
+        </p:nvSpPr>
+        <p:spPr>
+          <a:xfrm>
+            <a:off x="9856234" y="4563235"/>
+            <a:ext cx="1741182" cy="276999"/>
+          </a:xfrm>
+          <a:prstGeom prst="rect">
+            <a:avLst/>
+          </a:prstGeom>
+          <a:noFill/>
+        </p:spPr>
+        <p:txBody>
+          <a:bodyPr wrap="none" rtlCol="0">
+            <a:spAutoFit/>
+          </a:bodyPr>
+          <a:lstStyle/>
+          <a:p>
+            <a:r>
+              <a:rPr lang="es-ES" sz="1200" dirty="0">
+                <a:solidFill>
+                  <a:srgbClr val="C00000"/>
+                </a:solidFill>
+              </a:rPr>
+              <a:t> AAN160 + 50 Ba 590 </a:t>
+            </a:r>
+            <a:r>
+              <a:rPr lang="es-ES" sz="1200" dirty="0" err="1">
+                <a:solidFill>
+                  <a:srgbClr val="C00000"/>
+                </a:solidFill>
+              </a:rPr>
+              <a:t>nm</a:t>
+            </a:r>
+            <a:endParaRPr lang="es-ES" sz="1200" dirty="0">
+              <a:solidFill>
+                <a:srgbClr val="C00000"/>
+              </a:solidFill>
+            </a:endParaRPr>
+          </a:p>
+        </p:txBody>
+      </p:sp>
+      <p:sp>
+        <p:nvSpPr>
+          <p:cNvPr id="33" name="CuadroTexto 32"/>
+          <p:cNvSpPr txBox="1"/>
+          <p:nvPr/>
+        </p:nvSpPr>
+        <p:spPr>
+          <a:xfrm>
+            <a:off x="10314241" y="5024900"/>
+            <a:ext cx="1244251" cy="276999"/>
+          </a:xfrm>
+          <a:prstGeom prst="rect">
+            <a:avLst/>
+          </a:prstGeom>
+          <a:noFill/>
+        </p:spPr>
+        <p:txBody>
+          <a:bodyPr wrap="none" rtlCol="0">
+            <a:spAutoFit/>
+          </a:bodyPr>
+          <a:lstStyle/>
+          <a:p>
+            <a:r>
+              <a:rPr lang="es-ES" sz="1200" dirty="0">
+                <a:solidFill>
+                  <a:srgbClr val="00B050"/>
+                </a:solidFill>
+              </a:rPr>
+              <a:t> AAN160 590 </a:t>
+            </a:r>
+            <a:r>
+              <a:rPr lang="es-ES" sz="1200" dirty="0" err="1">
+                <a:solidFill>
+                  <a:srgbClr val="00B050"/>
+                </a:solidFill>
+              </a:rPr>
+              <a:t>nm</a:t>
+            </a:r>
+            <a:endParaRPr lang="es-ES" sz="1200" dirty="0">
+              <a:solidFill>
+                <a:srgbClr val="00B050"/>
+              </a:solidFill>
+            </a:endParaRPr>
+          </a:p>
+        </p:txBody>
+      </p:sp>
+      <p:sp>
+        <p:nvSpPr>
+          <p:cNvPr id="34" name="CuadroTexto 33"/>
+          <p:cNvSpPr txBox="1"/>
+          <p:nvPr/>
+        </p:nvSpPr>
+        <p:spPr>
+          <a:xfrm>
+            <a:off x="8251970" y="3084608"/>
+            <a:ext cx="1548822" cy="276999"/>
+          </a:xfrm>
+          <a:prstGeom prst="rect">
+            <a:avLst/>
+          </a:prstGeom>
+          <a:noFill/>
+        </p:spPr>
+        <p:txBody>
+          <a:bodyPr wrap="none" rtlCol="0">
+            <a:spAutoFit/>
+          </a:bodyPr>
+          <a:lstStyle/>
+          <a:p>
+            <a:r>
+              <a:rPr lang="es-ES" sz="1200" b="1" dirty="0"/>
+              <a:t>LIFETIME MODE-MCS</a:t>
+            </a:r>
+          </a:p>
+        </p:txBody>
+      </p:sp>
+      <p:sp>
+        <p:nvSpPr>
+          <p:cNvPr id="3" name="CuadroTexto 2"/>
+          <p:cNvSpPr txBox="1"/>
+          <p:nvPr/>
+        </p:nvSpPr>
+        <p:spPr>
+          <a:xfrm>
+            <a:off x="7423283" y="2046974"/>
+            <a:ext cx="571054" cy="276999"/>
+          </a:xfrm>
+          <a:prstGeom prst="rect">
+            <a:avLst/>
+          </a:prstGeom>
+          <a:noFill/>
+        </p:spPr>
+        <p:txBody>
+          <a:bodyPr wrap="none" rtlCol="0">
+            <a:spAutoFit/>
+          </a:bodyPr>
+          <a:lstStyle/>
+          <a:p>
+            <a:r>
+              <a:rPr lang="es-ES" sz="1200" b="1" dirty="0"/>
+              <a:t>TCSPC</a:t>
+            </a:r>
+          </a:p>
+        </p:txBody>
+      </p:sp>
+      <p:sp>
+        <p:nvSpPr>
+          <p:cNvPr id="35" name="CuadroTexto 34"/>
+          <p:cNvSpPr txBox="1"/>
+          <p:nvPr/>
+        </p:nvSpPr>
+        <p:spPr>
+          <a:xfrm>
+            <a:off x="1283666" y="2034421"/>
+            <a:ext cx="571054" cy="276999"/>
+          </a:xfrm>
+          <a:prstGeom prst="rect">
+            <a:avLst/>
+          </a:prstGeom>
+          <a:noFill/>
+        </p:spPr>
+        <p:txBody>
+          <a:bodyPr wrap="none" rtlCol="0">
+            <a:spAutoFit/>
+          </a:bodyPr>
+          <a:lstStyle/>
+          <a:p>
+            <a:r>
+              <a:rPr lang="es-ES" sz="1200" b="1" dirty="0"/>
+              <a:t>TCSPC</a:t>
+            </a:r>
+          </a:p>
+        </p:txBody>
+      </p:sp>
+      <p:sp>
+        <p:nvSpPr>
+          <p:cNvPr id="36" name="CuadroTexto 35"/>
+          <p:cNvSpPr txBox="1"/>
+          <p:nvPr/>
+        </p:nvSpPr>
+        <p:spPr>
+          <a:xfrm>
+            <a:off x="3400585" y="2042994"/>
+            <a:ext cx="473206" cy="276999"/>
+          </a:xfrm>
+          <a:prstGeom prst="rect">
+            <a:avLst/>
+          </a:prstGeom>
+          <a:noFill/>
+        </p:spPr>
+        <p:txBody>
+          <a:bodyPr wrap="none" rtlCol="0">
+            <a:spAutoFit/>
+          </a:bodyPr>
+          <a:lstStyle/>
+          <a:p>
+            <a:r>
+              <a:rPr lang="es-ES" sz="1200" b="1" dirty="0"/>
+              <a:t>MCS</a:t>
+            </a:r>
+          </a:p>
+        </p:txBody>
+      </p:sp>
+      <p:sp>
+        <p:nvSpPr>
+          <p:cNvPr id="37" name="CuadroTexto 36"/>
+          <p:cNvSpPr txBox="1"/>
+          <p:nvPr/>
+        </p:nvSpPr>
+        <p:spPr>
+          <a:xfrm>
+            <a:off x="9668370" y="2057135"/>
+            <a:ext cx="473206" cy="276999"/>
+          </a:xfrm>
+          <a:prstGeom prst="rect">
+            <a:avLst/>
+          </a:prstGeom>
+          <a:noFill/>
+        </p:spPr>
+        <p:txBody>
+          <a:bodyPr wrap="none" rtlCol="0">
+            <a:spAutoFit/>
+          </a:bodyPr>
+          <a:lstStyle/>
+          <a:p>
+            <a:r>
+              <a:rPr lang="es-ES" sz="1200" b="1" dirty="0"/>
+              <a:t>MCS</a:t>
+            </a:r>
+          </a:p>
+        </p:txBody>
+      </p:sp>
+      <p:sp>
+        <p:nvSpPr>
+          <p:cNvPr id="38" name="CuadroTexto 37"/>
+          <p:cNvSpPr txBox="1"/>
+          <p:nvPr/>
+        </p:nvSpPr>
+        <p:spPr>
+          <a:xfrm>
+            <a:off x="6668301" y="2163763"/>
+            <a:ext cx="1484445" cy="646331"/>
+          </a:xfrm>
+          <a:prstGeom prst="rect">
+            <a:avLst/>
+          </a:prstGeom>
+          <a:noFill/>
+        </p:spPr>
+        <p:txBody>
+          <a:bodyPr wrap="none" rtlCol="0">
+            <a:spAutoFit/>
+          </a:bodyPr>
+          <a:lstStyle/>
+          <a:p>
+            <a:pPr algn="ctr"/>
+            <a:r>
+              <a:rPr lang="es-ES" sz="1200" dirty="0" err="1"/>
+              <a:t>Measured</a:t>
+            </a:r>
+            <a:r>
+              <a:rPr lang="es-ES" sz="1200" dirty="0"/>
+              <a:t> at 500 </a:t>
+            </a:r>
+            <a:r>
+              <a:rPr lang="es-ES" sz="1200" dirty="0" err="1"/>
+              <a:t>nm</a:t>
+            </a:r>
+            <a:endParaRPr lang="es-ES" sz="1200" dirty="0"/>
+          </a:p>
+          <a:p>
+            <a:pPr algn="ctr"/>
+            <a:r>
+              <a:rPr lang="es-ES" sz="1200" dirty="0">
+                <a:latin typeface="Symbol" panose="05050102010706020507" pitchFamily="18" charset="2"/>
+              </a:rPr>
+              <a:t>t</a:t>
+            </a:r>
+            <a:r>
+              <a:rPr lang="es-ES" sz="1200" dirty="0"/>
+              <a:t> 2.81 </a:t>
+            </a:r>
+            <a:r>
+              <a:rPr lang="es-ES" sz="1200" dirty="0" err="1"/>
+              <a:t>ns</a:t>
+            </a:r>
+            <a:r>
+              <a:rPr lang="es-ES" sz="1200" dirty="0"/>
+              <a:t> (100%)</a:t>
+            </a:r>
+          </a:p>
+          <a:p>
+            <a:pPr algn="ctr"/>
+            <a:r>
+              <a:rPr lang="es-ES" sz="1200" dirty="0">
+                <a:latin typeface="Symbol" panose="05050102010706020507" pitchFamily="18" charset="2"/>
+              </a:rPr>
+              <a:t>c</a:t>
+            </a:r>
+            <a:r>
+              <a:rPr lang="es-ES" sz="1200" baseline="30000" dirty="0"/>
+              <a:t>2</a:t>
+            </a:r>
+            <a:r>
+              <a:rPr lang="es-ES" sz="1200" dirty="0"/>
+              <a:t> 1.081</a:t>
+            </a:r>
+          </a:p>
+        </p:txBody>
+      </p:sp>
+    </p:spTree>
+    <p:extLst>
+      <p:ext uri="{BB962C8B-B14F-4D97-AF65-F5344CB8AC3E}">
+        <p14:creationId xmlns:p14="http://schemas.microsoft.com/office/powerpoint/2010/main" val="2792645613"/>
+      </p:ext>
+    </p:extLst>
+  </p:cSld>
+  <p:clrMapOvr>
+    <a:masterClrMapping/>
+  </p:clrMapOvr>
+</p:sld>
+</file>
+
+<file path=ppt/slides/slide4.xml><?xml version="1.0" encoding="utf-8"?>
 <p:sld xmlns:a="http://schemas.openxmlformats.org/drawingml/2006/main" xmlns:r="http://schemas.openxmlformats.org/officeDocument/2006/relationships" xmlns:p="http://schemas.openxmlformats.org/presentationml/2006/main">
   <p:cSld>
     <p:spTree>
@@ -4768,7 +7241,7 @@
           <a:graphicData uri="http://schemas.openxmlformats.org/presentationml/2006/ole">
             <mc:AlternateContent xmlns:mc="http://schemas.openxmlformats.org/markup-compatibility/2006">
               <mc:Choice xmlns:v="urn:schemas-microsoft-com:vml" Requires="v">
-                <p:oleObj spid="_x0000_s2053" name="CS ChemDraw Drawing" r:id="rId4" imgW="2886075" imgH="1619778" progId="ChemDraw.Document.6.0">
+                <p:oleObj spid="_x0000_s2054" name="CS ChemDraw Drawing" r:id="rId4" imgW="2886075" imgH="1619778" progId="ChemDraw.Document.6.0">
                   <p:embed/>
                 </p:oleObj>
               </mc:Choice>
@@ -5015,47 +7488,982 @@
           </a:prstGeom>
         </p:spPr>
       </p:pic>
-      <p:sp>
-        <p:nvSpPr>
-          <p:cNvPr id="22" name="CuadroTexto 21"/>
-          <p:cNvSpPr txBox="1"/>
-          <p:nvPr/>
-        </p:nvSpPr>
-        <p:spPr>
-          <a:xfrm>
-            <a:off x="4692722" y="-45787"/>
-            <a:ext cx="3217099" cy="369332"/>
-          </a:xfrm>
-          <a:prstGeom prst="rect">
-            <a:avLst/>
-          </a:prstGeom>
-          <a:noFill/>
-        </p:spPr>
-        <p:txBody>
-          <a:bodyPr wrap="none" rtlCol="0">
-            <a:spAutoFit/>
-          </a:bodyPr>
-          <a:lstStyle/>
-          <a:p>
-            <a:r>
-              <a:rPr lang="es-ES" dirty="0"/>
-              <a:t>Time-resolved </a:t>
-            </a:r>
-            <a:r>
-              <a:rPr lang="es-ES" dirty="0" err="1"/>
-              <a:t>emission</a:t>
-            </a:r>
-            <a:r>
-              <a:rPr lang="es-ES" dirty="0"/>
-              <a:t> AAN155</a:t>
-            </a:r>
-          </a:p>
-        </p:txBody>
-      </p:sp>
     </p:spTree>
     <p:extLst>
       <p:ext uri="{BB962C8B-B14F-4D97-AF65-F5344CB8AC3E}">
         <p14:creationId xmlns:p14="http://schemas.microsoft.com/office/powerpoint/2010/main" val="3025519685"/>
+      </p:ext>
+    </p:extLst>
+  </p:cSld>
+  <p:clrMapOvr>
+    <a:masterClrMapping/>
+  </p:clrMapOvr>
+</p:sld>
+</file>
+
+<file path=ppt/slides/slide5.xml><?xml version="1.0" encoding="utf-8"?>
+<p:sld xmlns:a="http://schemas.openxmlformats.org/drawingml/2006/main" xmlns:r="http://schemas.openxmlformats.org/officeDocument/2006/relationships" xmlns:p="http://schemas.openxmlformats.org/presentationml/2006/main">
+  <p:cSld>
+    <p:spTree>
+      <p:nvGrpSpPr>
+        <p:cNvPr id="1" name=""/>
+        <p:cNvGrpSpPr/>
+        <p:nvPr/>
+      </p:nvGrpSpPr>
+      <p:grpSpPr>
+        <a:xfrm>
+          <a:off x="0" y="0"/>
+          <a:ext cx="0" cy="0"/>
+          <a:chOff x="0" y="0"/>
+          <a:chExt cx="0" cy="0"/>
+        </a:xfrm>
+      </p:grpSpPr>
+      <p:pic>
+        <p:nvPicPr>
+          <p:cNvPr id="8" name="Imagen 7"/>
+          <p:cNvPicPr>
+            <a:picLocks noChangeAspect="1"/>
+          </p:cNvPicPr>
+          <p:nvPr/>
+        </p:nvPicPr>
+        <p:blipFill>
+          <a:blip r:embed="rId3"/>
+          <a:stretch>
+            <a:fillRect/>
+          </a:stretch>
+        </p:blipFill>
+        <p:spPr>
+          <a:xfrm>
+            <a:off x="0" y="3232077"/>
+            <a:ext cx="4115156" cy="2469094"/>
+          </a:xfrm>
+          <a:prstGeom prst="rect">
+            <a:avLst/>
+          </a:prstGeom>
+        </p:spPr>
+      </p:pic>
+      <p:sp>
+        <p:nvSpPr>
+          <p:cNvPr id="10" name="Elipse 9"/>
+          <p:cNvSpPr/>
+          <p:nvPr/>
+        </p:nvSpPr>
+        <p:spPr>
+          <a:xfrm rot="5400000">
+            <a:off x="4926685" y="1009557"/>
+            <a:ext cx="1007676" cy="1516695"/>
+          </a:xfrm>
+          <a:prstGeom prst="ellipse">
+            <a:avLst/>
+          </a:prstGeom>
+          <a:gradFill flip="none" rotWithShape="1">
+            <a:gsLst>
+              <a:gs pos="31000">
+                <a:srgbClr val="D2FDD6"/>
+              </a:gs>
+              <a:gs pos="0">
+                <a:srgbClr val="29F73D"/>
+              </a:gs>
+              <a:gs pos="100000">
+                <a:schemeClr val="accent5">
+                  <a:lumMod val="0"/>
+                  <a:lumOff val="100000"/>
+                </a:schemeClr>
+              </a:gs>
+              <a:gs pos="77000">
+                <a:schemeClr val="bg1"/>
+              </a:gs>
+            </a:gsLst>
+            <a:path path="circle">
+              <a:fillToRect l="50000" t="50000" r="50000" b="50000"/>
+            </a:path>
+            <a:tileRect/>
+          </a:gradFill>
+          <a:ln>
+            <a:noFill/>
+          </a:ln>
+        </p:spPr>
+        <p:style>
+          <a:lnRef idx="2">
+            <a:schemeClr val="accent1">
+              <a:shade val="50000"/>
+            </a:schemeClr>
+          </a:lnRef>
+          <a:fillRef idx="1">
+            <a:schemeClr val="accent1"/>
+          </a:fillRef>
+          <a:effectRef idx="0">
+            <a:schemeClr val="accent1"/>
+          </a:effectRef>
+          <a:fontRef idx="minor">
+            <a:schemeClr val="lt1"/>
+          </a:fontRef>
+        </p:style>
+        <p:txBody>
+          <a:bodyPr rtlCol="0" anchor="ctr"/>
+          <a:lstStyle/>
+          <a:p>
+            <a:pPr algn="ctr"/>
+            <a:endParaRPr lang="es-ES"/>
+          </a:p>
+        </p:txBody>
+      </p:sp>
+      <p:sp>
+        <p:nvSpPr>
+          <p:cNvPr id="11" name="Elipse 10"/>
+          <p:cNvSpPr/>
+          <p:nvPr/>
+        </p:nvSpPr>
+        <p:spPr>
+          <a:xfrm rot="5400000">
+            <a:off x="4902499" y="1424616"/>
+            <a:ext cx="870022" cy="1765130"/>
+          </a:xfrm>
+          <a:prstGeom prst="ellipse">
+            <a:avLst/>
+          </a:prstGeom>
+          <a:gradFill flip="none" rotWithShape="1">
+            <a:gsLst>
+              <a:gs pos="15000">
+                <a:srgbClr val="FFD5B9"/>
+              </a:gs>
+              <a:gs pos="0">
+                <a:srgbClr val="FFAF79"/>
+              </a:gs>
+              <a:gs pos="100000">
+                <a:schemeClr val="accent5">
+                  <a:lumMod val="0"/>
+                  <a:lumOff val="100000"/>
+                </a:schemeClr>
+              </a:gs>
+              <a:gs pos="66000">
+                <a:schemeClr val="bg1"/>
+              </a:gs>
+            </a:gsLst>
+            <a:path path="circle">
+              <a:fillToRect l="50000" t="50000" r="50000" b="50000"/>
+            </a:path>
+            <a:tileRect/>
+          </a:gradFill>
+          <a:ln>
+            <a:noFill/>
+          </a:ln>
+        </p:spPr>
+        <p:style>
+          <a:lnRef idx="2">
+            <a:schemeClr val="accent1">
+              <a:shade val="50000"/>
+            </a:schemeClr>
+          </a:lnRef>
+          <a:fillRef idx="1">
+            <a:schemeClr val="accent1"/>
+          </a:fillRef>
+          <a:effectRef idx="0">
+            <a:schemeClr val="accent1"/>
+          </a:effectRef>
+          <a:fontRef idx="minor">
+            <a:schemeClr val="lt1"/>
+          </a:fontRef>
+        </p:style>
+        <p:txBody>
+          <a:bodyPr rtlCol="0" anchor="ctr"/>
+          <a:lstStyle/>
+          <a:p>
+            <a:pPr algn="ctr"/>
+            <a:endParaRPr lang="es-ES"/>
+          </a:p>
+        </p:txBody>
+      </p:sp>
+      <p:graphicFrame>
+        <p:nvGraphicFramePr>
+          <p:cNvPr id="12" name="Objeto 11"/>
+          <p:cNvGraphicFramePr>
+            <a:graphicFrameLocks noChangeAspect="1"/>
+          </p:cNvGraphicFramePr>
+          <p:nvPr/>
+        </p:nvGraphicFramePr>
+        <p:xfrm>
+          <a:off x="4856470" y="1385606"/>
+          <a:ext cx="2020252" cy="1133845"/>
+        </p:xfrm>
+        <a:graphic>
+          <a:graphicData uri="http://schemas.openxmlformats.org/presentationml/2006/ole">
+            <mc:AlternateContent xmlns:mc="http://schemas.openxmlformats.org/markup-compatibility/2006">
+              <mc:Choice xmlns:v="urn:schemas-microsoft-com:vml" Requires="v">
+                <p:oleObj spid="_x0000_s9218" name="CS ChemDraw Drawing" r:id="rId4" imgW="2886075" imgH="1619778" progId="ChemDraw.Document.6.0">
+                  <p:embed/>
+                </p:oleObj>
+              </mc:Choice>
+              <mc:Fallback>
+                <p:oleObj name="CS ChemDraw Drawing" r:id="rId4" imgW="2886075" imgH="1619778" progId="ChemDraw.Document.6.0">
+                  <p:embed/>
+                  <p:pic>
+                    <p:nvPicPr>
+                      <p:cNvPr id="12" name="Objeto 11"/>
+                      <p:cNvPicPr/>
+                      <p:nvPr/>
+                    </p:nvPicPr>
+                    <p:blipFill>
+                      <a:blip r:embed="rId5"/>
+                      <a:stretch>
+                        <a:fillRect/>
+                      </a:stretch>
+                    </p:blipFill>
+                    <p:spPr>
+                      <a:xfrm>
+                        <a:off x="4856470" y="1385606"/>
+                        <a:ext cx="2020252" cy="1133845"/>
+                      </a:xfrm>
+                      <a:prstGeom prst="rect">
+                        <a:avLst/>
+                      </a:prstGeom>
+                    </p:spPr>
+                  </p:pic>
+                </p:oleObj>
+              </mc:Fallback>
+            </mc:AlternateContent>
+          </a:graphicData>
+        </a:graphic>
+      </p:graphicFrame>
+      <p:sp>
+        <p:nvSpPr>
+          <p:cNvPr id="13" name="Elipse 12"/>
+          <p:cNvSpPr/>
+          <p:nvPr/>
+        </p:nvSpPr>
+        <p:spPr>
+          <a:xfrm rot="5400000">
+            <a:off x="1256851" y="1000122"/>
+            <a:ext cx="1007676" cy="1516695"/>
+          </a:xfrm>
+          <a:prstGeom prst="ellipse">
+            <a:avLst/>
+          </a:prstGeom>
+          <a:gradFill flip="none" rotWithShape="1">
+            <a:gsLst>
+              <a:gs pos="31000">
+                <a:srgbClr val="D2FDD6"/>
+              </a:gs>
+              <a:gs pos="0">
+                <a:srgbClr val="29F73D"/>
+              </a:gs>
+              <a:gs pos="100000">
+                <a:schemeClr val="accent5">
+                  <a:lumMod val="0"/>
+                  <a:lumOff val="100000"/>
+                </a:schemeClr>
+              </a:gs>
+              <a:gs pos="77000">
+                <a:schemeClr val="bg1"/>
+              </a:gs>
+            </a:gsLst>
+            <a:path path="circle">
+              <a:fillToRect l="50000" t="50000" r="50000" b="50000"/>
+            </a:path>
+            <a:tileRect/>
+          </a:gradFill>
+          <a:ln>
+            <a:noFill/>
+          </a:ln>
+        </p:spPr>
+        <p:style>
+          <a:lnRef idx="2">
+            <a:schemeClr val="accent1">
+              <a:shade val="50000"/>
+            </a:schemeClr>
+          </a:lnRef>
+          <a:fillRef idx="1">
+            <a:schemeClr val="accent1"/>
+          </a:fillRef>
+          <a:effectRef idx="0">
+            <a:schemeClr val="accent1"/>
+          </a:effectRef>
+          <a:fontRef idx="minor">
+            <a:schemeClr val="lt1"/>
+          </a:fontRef>
+        </p:style>
+        <p:txBody>
+          <a:bodyPr rtlCol="0" anchor="ctr"/>
+          <a:lstStyle/>
+          <a:p>
+            <a:pPr algn="ctr"/>
+            <a:endParaRPr lang="es-ES"/>
+          </a:p>
+        </p:txBody>
+      </p:sp>
+      <p:sp>
+        <p:nvSpPr>
+          <p:cNvPr id="14" name="CuadroTexto 13"/>
+          <p:cNvSpPr txBox="1"/>
+          <p:nvPr/>
+        </p:nvSpPr>
+        <p:spPr>
+          <a:xfrm>
+            <a:off x="1241017" y="2516492"/>
+            <a:ext cx="950901" cy="369332"/>
+          </a:xfrm>
+          <a:prstGeom prst="rect">
+            <a:avLst/>
+          </a:prstGeom>
+          <a:noFill/>
+        </p:spPr>
+        <p:txBody>
+          <a:bodyPr wrap="none" rtlCol="0">
+            <a:spAutoFit/>
+          </a:bodyPr>
+          <a:lstStyle/>
+          <a:p>
+            <a:r>
+              <a:rPr lang="es-ES" dirty="0">
+                <a:solidFill>
+                  <a:srgbClr val="00B050"/>
+                </a:solidFill>
+              </a:rPr>
+              <a:t>AAN155</a:t>
+            </a:r>
+          </a:p>
+        </p:txBody>
+      </p:sp>
+      <p:sp>
+        <p:nvSpPr>
+          <p:cNvPr id="15" name="CuadroTexto 14"/>
+          <p:cNvSpPr txBox="1"/>
+          <p:nvPr/>
+        </p:nvSpPr>
+        <p:spPr>
+          <a:xfrm>
+            <a:off x="4731869" y="2482426"/>
+            <a:ext cx="1457002" cy="369332"/>
+          </a:xfrm>
+          <a:prstGeom prst="rect">
+            <a:avLst/>
+          </a:prstGeom>
+          <a:noFill/>
+        </p:spPr>
+        <p:txBody>
+          <a:bodyPr wrap="none" rtlCol="0">
+            <a:spAutoFit/>
+          </a:bodyPr>
+          <a:lstStyle/>
+          <a:p>
+            <a:r>
+              <a:rPr lang="es-ES" dirty="0">
+                <a:solidFill>
+                  <a:srgbClr val="C00000"/>
+                </a:solidFill>
+              </a:rPr>
+              <a:t>AAN155+Ba</a:t>
+            </a:r>
+            <a:r>
+              <a:rPr lang="es-ES" baseline="30000" dirty="0">
+                <a:solidFill>
+                  <a:srgbClr val="C00000"/>
+                </a:solidFill>
+              </a:rPr>
+              <a:t>++</a:t>
+            </a:r>
+          </a:p>
+        </p:txBody>
+      </p:sp>
+      <p:pic>
+        <p:nvPicPr>
+          <p:cNvPr id="16" name="Imagen 15"/>
+          <p:cNvPicPr>
+            <a:picLocks noChangeAspect="1"/>
+          </p:cNvPicPr>
+          <p:nvPr/>
+        </p:nvPicPr>
+        <p:blipFill>
+          <a:blip r:embed="rId6"/>
+          <a:stretch>
+            <a:fillRect/>
+          </a:stretch>
+        </p:blipFill>
+        <p:spPr>
+          <a:xfrm>
+            <a:off x="1002341" y="1197832"/>
+            <a:ext cx="2026920" cy="1140143"/>
+          </a:xfrm>
+          <a:prstGeom prst="rect">
+            <a:avLst/>
+          </a:prstGeom>
+        </p:spPr>
+      </p:pic>
+      <p:pic>
+        <p:nvPicPr>
+          <p:cNvPr id="20" name="Imagen 19"/>
+          <p:cNvPicPr>
+            <a:picLocks noChangeAspect="1"/>
+          </p:cNvPicPr>
+          <p:nvPr/>
+        </p:nvPicPr>
+        <p:blipFill>
+          <a:blip r:embed="rId7"/>
+          <a:stretch>
+            <a:fillRect/>
+          </a:stretch>
+        </p:blipFill>
+        <p:spPr>
+          <a:xfrm>
+            <a:off x="7923306" y="3232077"/>
+            <a:ext cx="4115156" cy="2469094"/>
+          </a:xfrm>
+          <a:prstGeom prst="rect">
+            <a:avLst/>
+          </a:prstGeom>
+        </p:spPr>
+      </p:pic>
+      <p:pic>
+        <p:nvPicPr>
+          <p:cNvPr id="21" name="Imagen 20"/>
+          <p:cNvPicPr>
+            <a:picLocks noChangeAspect="1"/>
+          </p:cNvPicPr>
+          <p:nvPr/>
+        </p:nvPicPr>
+        <p:blipFill>
+          <a:blip r:embed="rId8"/>
+          <a:stretch>
+            <a:fillRect/>
+          </a:stretch>
+        </p:blipFill>
+        <p:spPr>
+          <a:xfrm>
+            <a:off x="3961653" y="3232077"/>
+            <a:ext cx="4115156" cy="2469094"/>
+          </a:xfrm>
+          <a:prstGeom prst="rect">
+            <a:avLst/>
+          </a:prstGeom>
+        </p:spPr>
+      </p:pic>
+      <p:sp>
+        <p:nvSpPr>
+          <p:cNvPr id="22" name="CuadroTexto 21"/>
+          <p:cNvSpPr txBox="1"/>
+          <p:nvPr/>
+        </p:nvSpPr>
+        <p:spPr>
+          <a:xfrm>
+            <a:off x="4692722" y="-45787"/>
+            <a:ext cx="3217099" cy="369332"/>
+          </a:xfrm>
+          <a:prstGeom prst="rect">
+            <a:avLst/>
+          </a:prstGeom>
+          <a:noFill/>
+        </p:spPr>
+        <p:txBody>
+          <a:bodyPr wrap="none" rtlCol="0">
+            <a:spAutoFit/>
+          </a:bodyPr>
+          <a:lstStyle/>
+          <a:p>
+            <a:r>
+              <a:rPr lang="es-ES" dirty="0"/>
+              <a:t>Time-resolved </a:t>
+            </a:r>
+            <a:r>
+              <a:rPr lang="es-ES" dirty="0" err="1"/>
+              <a:t>emission</a:t>
+            </a:r>
+            <a:r>
+              <a:rPr lang="es-ES" dirty="0"/>
+              <a:t> AAN155</a:t>
+            </a:r>
+          </a:p>
+        </p:txBody>
+      </p:sp>
+    </p:spTree>
+    <p:extLst>
+      <p:ext uri="{BB962C8B-B14F-4D97-AF65-F5344CB8AC3E}">
+        <p14:creationId xmlns:p14="http://schemas.microsoft.com/office/powerpoint/2010/main" val="2447103899"/>
+      </p:ext>
+    </p:extLst>
+  </p:cSld>
+  <p:clrMapOvr>
+    <a:masterClrMapping/>
+  </p:clrMapOvr>
+</p:sld>
+</file>
+
+<file path=ppt/slides/slide6.xml><?xml version="1.0" encoding="utf-8"?>
+<p:sld xmlns:a="http://schemas.openxmlformats.org/drawingml/2006/main" xmlns:r="http://schemas.openxmlformats.org/officeDocument/2006/relationships" xmlns:p="http://schemas.openxmlformats.org/presentationml/2006/main">
+  <p:cSld>
+    <p:spTree>
+      <p:nvGrpSpPr>
+        <p:cNvPr id="1" name=""/>
+        <p:cNvGrpSpPr/>
+        <p:nvPr/>
+      </p:nvGrpSpPr>
+      <p:grpSpPr>
+        <a:xfrm>
+          <a:off x="0" y="0"/>
+          <a:ext cx="0" cy="0"/>
+          <a:chOff x="0" y="0"/>
+          <a:chExt cx="0" cy="0"/>
+        </a:xfrm>
+      </p:grpSpPr>
+      <p:pic>
+        <p:nvPicPr>
+          <p:cNvPr id="8" name="Imagen 7"/>
+          <p:cNvPicPr>
+            <a:picLocks noChangeAspect="1"/>
+          </p:cNvPicPr>
+          <p:nvPr/>
+        </p:nvPicPr>
+        <p:blipFill>
+          <a:blip r:embed="rId3"/>
+          <a:stretch>
+            <a:fillRect/>
+          </a:stretch>
+        </p:blipFill>
+        <p:spPr>
+          <a:xfrm>
+            <a:off x="0" y="3232077"/>
+            <a:ext cx="4115156" cy="2469094"/>
+          </a:xfrm>
+          <a:prstGeom prst="rect">
+            <a:avLst/>
+          </a:prstGeom>
+        </p:spPr>
+      </p:pic>
+      <p:sp>
+        <p:nvSpPr>
+          <p:cNvPr id="10" name="Elipse 9"/>
+          <p:cNvSpPr/>
+          <p:nvPr/>
+        </p:nvSpPr>
+        <p:spPr>
+          <a:xfrm rot="5400000">
+            <a:off x="4926685" y="1009557"/>
+            <a:ext cx="1007676" cy="1516695"/>
+          </a:xfrm>
+          <a:prstGeom prst="ellipse">
+            <a:avLst/>
+          </a:prstGeom>
+          <a:gradFill flip="none" rotWithShape="1">
+            <a:gsLst>
+              <a:gs pos="31000">
+                <a:srgbClr val="D2FDD6"/>
+              </a:gs>
+              <a:gs pos="0">
+                <a:srgbClr val="29F73D"/>
+              </a:gs>
+              <a:gs pos="100000">
+                <a:schemeClr val="accent5">
+                  <a:lumMod val="0"/>
+                  <a:lumOff val="100000"/>
+                </a:schemeClr>
+              </a:gs>
+              <a:gs pos="77000">
+                <a:schemeClr val="bg1"/>
+              </a:gs>
+            </a:gsLst>
+            <a:path path="circle">
+              <a:fillToRect l="50000" t="50000" r="50000" b="50000"/>
+            </a:path>
+            <a:tileRect/>
+          </a:gradFill>
+          <a:ln>
+            <a:noFill/>
+          </a:ln>
+        </p:spPr>
+        <p:style>
+          <a:lnRef idx="2">
+            <a:schemeClr val="accent1">
+              <a:shade val="50000"/>
+            </a:schemeClr>
+          </a:lnRef>
+          <a:fillRef idx="1">
+            <a:schemeClr val="accent1"/>
+          </a:fillRef>
+          <a:effectRef idx="0">
+            <a:schemeClr val="accent1"/>
+          </a:effectRef>
+          <a:fontRef idx="minor">
+            <a:schemeClr val="lt1"/>
+          </a:fontRef>
+        </p:style>
+        <p:txBody>
+          <a:bodyPr rtlCol="0" anchor="ctr"/>
+          <a:lstStyle/>
+          <a:p>
+            <a:pPr algn="ctr"/>
+            <a:endParaRPr lang="es-ES"/>
+          </a:p>
+        </p:txBody>
+      </p:sp>
+      <p:sp>
+        <p:nvSpPr>
+          <p:cNvPr id="11" name="Elipse 10"/>
+          <p:cNvSpPr/>
+          <p:nvPr/>
+        </p:nvSpPr>
+        <p:spPr>
+          <a:xfrm rot="5400000">
+            <a:off x="4902499" y="1424616"/>
+            <a:ext cx="870022" cy="1765130"/>
+          </a:xfrm>
+          <a:prstGeom prst="ellipse">
+            <a:avLst/>
+          </a:prstGeom>
+          <a:gradFill flip="none" rotWithShape="1">
+            <a:gsLst>
+              <a:gs pos="15000">
+                <a:srgbClr val="FFD5B9"/>
+              </a:gs>
+              <a:gs pos="0">
+                <a:srgbClr val="FFAF79"/>
+              </a:gs>
+              <a:gs pos="100000">
+                <a:schemeClr val="accent5">
+                  <a:lumMod val="0"/>
+                  <a:lumOff val="100000"/>
+                </a:schemeClr>
+              </a:gs>
+              <a:gs pos="66000">
+                <a:schemeClr val="bg1"/>
+              </a:gs>
+            </a:gsLst>
+            <a:path path="circle">
+              <a:fillToRect l="50000" t="50000" r="50000" b="50000"/>
+            </a:path>
+            <a:tileRect/>
+          </a:gradFill>
+          <a:ln>
+            <a:noFill/>
+          </a:ln>
+        </p:spPr>
+        <p:style>
+          <a:lnRef idx="2">
+            <a:schemeClr val="accent1">
+              <a:shade val="50000"/>
+            </a:schemeClr>
+          </a:lnRef>
+          <a:fillRef idx="1">
+            <a:schemeClr val="accent1"/>
+          </a:fillRef>
+          <a:effectRef idx="0">
+            <a:schemeClr val="accent1"/>
+          </a:effectRef>
+          <a:fontRef idx="minor">
+            <a:schemeClr val="lt1"/>
+          </a:fontRef>
+        </p:style>
+        <p:txBody>
+          <a:bodyPr rtlCol="0" anchor="ctr"/>
+          <a:lstStyle/>
+          <a:p>
+            <a:pPr algn="ctr"/>
+            <a:endParaRPr lang="es-ES"/>
+          </a:p>
+        </p:txBody>
+      </p:sp>
+      <p:graphicFrame>
+        <p:nvGraphicFramePr>
+          <p:cNvPr id="12" name="Objeto 11"/>
+          <p:cNvGraphicFramePr>
+            <a:graphicFrameLocks noChangeAspect="1"/>
+          </p:cNvGraphicFramePr>
+          <p:nvPr/>
+        </p:nvGraphicFramePr>
+        <p:xfrm>
+          <a:off x="4856470" y="1385606"/>
+          <a:ext cx="2020252" cy="1133845"/>
+        </p:xfrm>
+        <a:graphic>
+          <a:graphicData uri="http://schemas.openxmlformats.org/presentationml/2006/ole">
+            <mc:AlternateContent xmlns:mc="http://schemas.openxmlformats.org/markup-compatibility/2006">
+              <mc:Choice xmlns:v="urn:schemas-microsoft-com:vml" Requires="v">
+                <p:oleObj spid="_x0000_s7170" name="CS ChemDraw Drawing" r:id="rId4" imgW="2886075" imgH="1619778" progId="ChemDraw.Document.6.0">
+                  <p:embed/>
+                </p:oleObj>
+              </mc:Choice>
+              <mc:Fallback>
+                <p:oleObj name="CS ChemDraw Drawing" r:id="rId4" imgW="2886075" imgH="1619778" progId="ChemDraw.Document.6.0">
+                  <p:embed/>
+                  <p:pic>
+                    <p:nvPicPr>
+                      <p:cNvPr id="12" name="Objeto 11"/>
+                      <p:cNvPicPr/>
+                      <p:nvPr/>
+                    </p:nvPicPr>
+                    <p:blipFill>
+                      <a:blip r:embed="rId5"/>
+                      <a:stretch>
+                        <a:fillRect/>
+                      </a:stretch>
+                    </p:blipFill>
+                    <p:spPr>
+                      <a:xfrm>
+                        <a:off x="4856470" y="1385606"/>
+                        <a:ext cx="2020252" cy="1133845"/>
+                      </a:xfrm>
+                      <a:prstGeom prst="rect">
+                        <a:avLst/>
+                      </a:prstGeom>
+                    </p:spPr>
+                  </p:pic>
+                </p:oleObj>
+              </mc:Fallback>
+            </mc:AlternateContent>
+          </a:graphicData>
+        </a:graphic>
+      </p:graphicFrame>
+      <p:sp>
+        <p:nvSpPr>
+          <p:cNvPr id="13" name="Elipse 12"/>
+          <p:cNvSpPr/>
+          <p:nvPr/>
+        </p:nvSpPr>
+        <p:spPr>
+          <a:xfrm rot="5400000">
+            <a:off x="1256851" y="1000122"/>
+            <a:ext cx="1007676" cy="1516695"/>
+          </a:xfrm>
+          <a:prstGeom prst="ellipse">
+            <a:avLst/>
+          </a:prstGeom>
+          <a:gradFill flip="none" rotWithShape="1">
+            <a:gsLst>
+              <a:gs pos="31000">
+                <a:srgbClr val="D2FDD6"/>
+              </a:gs>
+              <a:gs pos="0">
+                <a:srgbClr val="29F73D"/>
+              </a:gs>
+              <a:gs pos="100000">
+                <a:schemeClr val="accent5">
+                  <a:lumMod val="0"/>
+                  <a:lumOff val="100000"/>
+                </a:schemeClr>
+              </a:gs>
+              <a:gs pos="77000">
+                <a:schemeClr val="bg1"/>
+              </a:gs>
+            </a:gsLst>
+            <a:path path="circle">
+              <a:fillToRect l="50000" t="50000" r="50000" b="50000"/>
+            </a:path>
+            <a:tileRect/>
+          </a:gradFill>
+          <a:ln>
+            <a:noFill/>
+          </a:ln>
+        </p:spPr>
+        <p:style>
+          <a:lnRef idx="2">
+            <a:schemeClr val="accent1">
+              <a:shade val="50000"/>
+            </a:schemeClr>
+          </a:lnRef>
+          <a:fillRef idx="1">
+            <a:schemeClr val="accent1"/>
+          </a:fillRef>
+          <a:effectRef idx="0">
+            <a:schemeClr val="accent1"/>
+          </a:effectRef>
+          <a:fontRef idx="minor">
+            <a:schemeClr val="lt1"/>
+          </a:fontRef>
+        </p:style>
+        <p:txBody>
+          <a:bodyPr rtlCol="0" anchor="ctr"/>
+          <a:lstStyle/>
+          <a:p>
+            <a:pPr algn="ctr"/>
+            <a:endParaRPr lang="es-ES"/>
+          </a:p>
+        </p:txBody>
+      </p:sp>
+      <p:sp>
+        <p:nvSpPr>
+          <p:cNvPr id="14" name="CuadroTexto 13"/>
+          <p:cNvSpPr txBox="1"/>
+          <p:nvPr/>
+        </p:nvSpPr>
+        <p:spPr>
+          <a:xfrm>
+            <a:off x="1241017" y="2516492"/>
+            <a:ext cx="950901" cy="369332"/>
+          </a:xfrm>
+          <a:prstGeom prst="rect">
+            <a:avLst/>
+          </a:prstGeom>
+          <a:noFill/>
+        </p:spPr>
+        <p:txBody>
+          <a:bodyPr wrap="none" rtlCol="0">
+            <a:spAutoFit/>
+          </a:bodyPr>
+          <a:lstStyle/>
+          <a:p>
+            <a:r>
+              <a:rPr lang="es-ES" dirty="0">
+                <a:solidFill>
+                  <a:srgbClr val="00B050"/>
+                </a:solidFill>
+              </a:rPr>
+              <a:t>AAN155</a:t>
+            </a:r>
+          </a:p>
+        </p:txBody>
+      </p:sp>
+      <p:sp>
+        <p:nvSpPr>
+          <p:cNvPr id="15" name="CuadroTexto 14"/>
+          <p:cNvSpPr txBox="1"/>
+          <p:nvPr/>
+        </p:nvSpPr>
+        <p:spPr>
+          <a:xfrm>
+            <a:off x="4731869" y="2482426"/>
+            <a:ext cx="1457002" cy="369332"/>
+          </a:xfrm>
+          <a:prstGeom prst="rect">
+            <a:avLst/>
+          </a:prstGeom>
+          <a:noFill/>
+        </p:spPr>
+        <p:txBody>
+          <a:bodyPr wrap="none" rtlCol="0">
+            <a:spAutoFit/>
+          </a:bodyPr>
+          <a:lstStyle/>
+          <a:p>
+            <a:r>
+              <a:rPr lang="es-ES" dirty="0">
+                <a:solidFill>
+                  <a:srgbClr val="C00000"/>
+                </a:solidFill>
+              </a:rPr>
+              <a:t>AAN155+Ba</a:t>
+            </a:r>
+            <a:r>
+              <a:rPr lang="es-ES" baseline="30000" dirty="0">
+                <a:solidFill>
+                  <a:srgbClr val="C00000"/>
+                </a:solidFill>
+              </a:rPr>
+              <a:t>++</a:t>
+            </a:r>
+          </a:p>
+        </p:txBody>
+      </p:sp>
+      <p:pic>
+        <p:nvPicPr>
+          <p:cNvPr id="16" name="Imagen 15"/>
+          <p:cNvPicPr>
+            <a:picLocks noChangeAspect="1"/>
+          </p:cNvPicPr>
+          <p:nvPr/>
+        </p:nvPicPr>
+        <p:blipFill>
+          <a:blip r:embed="rId6"/>
+          <a:stretch>
+            <a:fillRect/>
+          </a:stretch>
+        </p:blipFill>
+        <p:spPr>
+          <a:xfrm>
+            <a:off x="1002341" y="1197832"/>
+            <a:ext cx="2026920" cy="1140143"/>
+          </a:xfrm>
+          <a:prstGeom prst="rect">
+            <a:avLst/>
+          </a:prstGeom>
+        </p:spPr>
+      </p:pic>
+      <p:pic>
+        <p:nvPicPr>
+          <p:cNvPr id="20" name="Imagen 19"/>
+          <p:cNvPicPr>
+            <a:picLocks noChangeAspect="1"/>
+          </p:cNvPicPr>
+          <p:nvPr/>
+        </p:nvPicPr>
+        <p:blipFill>
+          <a:blip r:embed="rId7"/>
+          <a:stretch>
+            <a:fillRect/>
+          </a:stretch>
+        </p:blipFill>
+        <p:spPr>
+          <a:xfrm>
+            <a:off x="7923306" y="3232077"/>
+            <a:ext cx="4115156" cy="2469094"/>
+          </a:xfrm>
+          <a:prstGeom prst="rect">
+            <a:avLst/>
+          </a:prstGeom>
+        </p:spPr>
+      </p:pic>
+      <p:pic>
+        <p:nvPicPr>
+          <p:cNvPr id="21" name="Imagen 20"/>
+          <p:cNvPicPr>
+            <a:picLocks noChangeAspect="1"/>
+          </p:cNvPicPr>
+          <p:nvPr/>
+        </p:nvPicPr>
+        <p:blipFill>
+          <a:blip r:embed="rId8"/>
+          <a:stretch>
+            <a:fillRect/>
+          </a:stretch>
+        </p:blipFill>
+        <p:spPr>
+          <a:xfrm>
+            <a:off x="3961653" y="3232077"/>
+            <a:ext cx="4115156" cy="2469094"/>
+          </a:xfrm>
+          <a:prstGeom prst="rect">
+            <a:avLst/>
+          </a:prstGeom>
+        </p:spPr>
+      </p:pic>
+      <p:sp>
+        <p:nvSpPr>
+          <p:cNvPr id="22" name="CuadroTexto 21"/>
+          <p:cNvSpPr txBox="1"/>
+          <p:nvPr/>
+        </p:nvSpPr>
+        <p:spPr>
+          <a:xfrm>
+            <a:off x="4692722" y="-45787"/>
+            <a:ext cx="3217099" cy="369332"/>
+          </a:xfrm>
+          <a:prstGeom prst="rect">
+            <a:avLst/>
+          </a:prstGeom>
+          <a:noFill/>
+        </p:spPr>
+        <p:txBody>
+          <a:bodyPr wrap="none" rtlCol="0">
+            <a:spAutoFit/>
+          </a:bodyPr>
+          <a:lstStyle/>
+          <a:p>
+            <a:r>
+              <a:rPr lang="es-ES" dirty="0"/>
+              <a:t>Time-resolved </a:t>
+            </a:r>
+            <a:r>
+              <a:rPr lang="es-ES" dirty="0" err="1"/>
+              <a:t>emission</a:t>
+            </a:r>
+            <a:r>
+              <a:rPr lang="es-ES" dirty="0"/>
+              <a:t> AAN155</a:t>
+            </a:r>
+          </a:p>
+        </p:txBody>
+      </p:sp>
+    </p:spTree>
+    <p:extLst>
+      <p:ext uri="{BB962C8B-B14F-4D97-AF65-F5344CB8AC3E}">
+        <p14:creationId xmlns:p14="http://schemas.microsoft.com/office/powerpoint/2010/main" val="3478128315"/>
       </p:ext>
     </p:extLst>
   </p:cSld>

</xml_diff>